<commit_message>
Adding Instructions for Feynman Method
</commit_message>
<xml_diff>
--- a/Presentations/656_project_slide_v2.pptx
+++ b/Presentations/656_project_slide_v2.pptx
@@ -1,35 +1,35 @@
 
 <file path=ppt/presentation.xml><?xml version="1.0" encoding="utf-8"?>
-<p:presentation xmlns:a="http://schemas.openxmlformats.org/drawingml/2006/main" xmlns:r="http://schemas.openxmlformats.org/officeDocument/2006/relationships" xmlns:mc="http://schemas.openxmlformats.org/markup-compatibility/2006" xmlns:mv="urn:schemas-microsoft-com:mac:vml" xmlns:p="http://schemas.openxmlformats.org/presentationml/2006/main" xmlns:c="http://schemas.openxmlformats.org/drawingml/2006/chart" xmlns:dgm="http://schemas.openxmlformats.org/drawingml/2006/diagram" xmlns:o="urn:schemas-microsoft-com:office:office" xmlns:v="urn:schemas-microsoft-com:vml" xmlns:pvml="urn:schemas-microsoft-com:office:powerpoint" xmlns:com="http://schemas.openxmlformats.org/drawingml/2006/compatibility" xmlns:p14="http://schemas.microsoft.com/office/powerpoint/2010/main" xmlns:p15="http://schemas.microsoft.com/office/powerpoint/2012/main" xmlns:ahyp="http://schemas.microsoft.com/office/drawing/2018/hyperlinkcolor" autoCompressPictures="0" embedTrueTypeFonts="1" strictFirstAndLastChars="0" saveSubsetFonts="1">
+<p:presentation xmlns:a="http://schemas.openxmlformats.org/drawingml/2006/main" xmlns:r="http://schemas.openxmlformats.org/officeDocument/2006/relationships" xmlns:p="http://schemas.openxmlformats.org/presentationml/2006/main" strictFirstAndLastChars="0" embedTrueTypeFonts="1" saveSubsetFonts="1" autoCompressPictures="0">
   <p:sldMasterIdLst>
-    <p:sldMasterId id="2147483659" r:id="rId4"/>
+    <p:sldMasterId id="2147483659" r:id="rId1"/>
   </p:sldMasterIdLst>
   <p:notesMasterIdLst>
-    <p:notesMasterId r:id="rId5"/>
+    <p:notesMasterId r:id="rId3"/>
   </p:notesMasterIdLst>
   <p:sldIdLst>
-    <p:sldId id="256" r:id="rId6"/>
+    <p:sldId id="256" r:id="rId2"/>
   </p:sldIdLst>
-  <p:sldSz cy="5143500" cx="9144000"/>
+  <p:sldSz cx="9144000" cy="5143500" type="screen16x9"/>
   <p:notesSz cx="6858000" cy="9144000"/>
   <p:embeddedFontLst>
     <p:embeddedFont>
-      <p:font typeface="Economica"/>
-      <p:regular r:id="rId7"/>
-      <p:bold r:id="rId8"/>
-      <p:italic r:id="rId9"/>
-      <p:boldItalic r:id="rId10"/>
+      <p:font typeface="Economica" panose="020B0604020202020204" charset="0"/>
+      <p:regular r:id="rId4"/>
+      <p:bold r:id="rId5"/>
+      <p:italic r:id="rId6"/>
+      <p:boldItalic r:id="rId7"/>
     </p:embeddedFont>
     <p:embeddedFont>
-      <p:font typeface="Open Sans"/>
-      <p:regular r:id="rId11"/>
-      <p:bold r:id="rId12"/>
-      <p:italic r:id="rId13"/>
-      <p:boldItalic r:id="rId14"/>
+      <p:font typeface="Open Sans" panose="020B0606030504020204" pitchFamily="34" charset="0"/>
+      <p:regular r:id="rId8"/>
+      <p:bold r:id="rId9"/>
+      <p:italic r:id="rId10"/>
+      <p:boldItalic r:id="rId11"/>
     </p:embeddedFont>
   </p:embeddedFontLst>
   <p:defaultTextStyle>
-    <a:defPPr lvl="0" marR="0" rtl="0" algn="l">
+    <a:defPPr marR="0" lvl="0" algn="l" rtl="0">
       <a:lnSpc>
         <a:spcPct val="100000"/>
       </a:lnSpc>
@@ -40,7 +40,7 @@
         <a:spcPts val="0"/>
       </a:spcAft>
     </a:defPPr>
-    <a:lvl1pPr lvl="0" marR="0" rtl="0" algn="l">
+    <a:lvl1pPr marR="0" lvl="0" algn="l" rtl="0">
       <a:lnSpc>
         <a:spcPct val="100000"/>
       </a:lnSpc>
@@ -54,7 +54,7 @@
         <a:srgbClr val="000000"/>
       </a:buClr>
       <a:buFont typeface="Arial"/>
-      <a:defRPr b="0" i="0" sz="1400" u="none" cap="none" strike="noStrike">
+      <a:defRPr sz="1400" b="0" i="0" u="none" strike="noStrike" cap="none">
         <a:solidFill>
           <a:srgbClr val="000000"/>
         </a:solidFill>
@@ -64,7 +64,7 @@
         <a:sym typeface="Arial"/>
       </a:defRPr>
     </a:lvl1pPr>
-    <a:lvl2pPr lvl="1" marR="0" rtl="0" algn="l">
+    <a:lvl2pPr marR="0" lvl="1" algn="l" rtl="0">
       <a:lnSpc>
         <a:spcPct val="100000"/>
       </a:lnSpc>
@@ -78,7 +78,7 @@
         <a:srgbClr val="000000"/>
       </a:buClr>
       <a:buFont typeface="Arial"/>
-      <a:defRPr b="0" i="0" sz="1400" u="none" cap="none" strike="noStrike">
+      <a:defRPr sz="1400" b="0" i="0" u="none" strike="noStrike" cap="none">
         <a:solidFill>
           <a:srgbClr val="000000"/>
         </a:solidFill>
@@ -88,7 +88,7 @@
         <a:sym typeface="Arial"/>
       </a:defRPr>
     </a:lvl2pPr>
-    <a:lvl3pPr lvl="2" marR="0" rtl="0" algn="l">
+    <a:lvl3pPr marR="0" lvl="2" algn="l" rtl="0">
       <a:lnSpc>
         <a:spcPct val="100000"/>
       </a:lnSpc>
@@ -102,7 +102,7 @@
         <a:srgbClr val="000000"/>
       </a:buClr>
       <a:buFont typeface="Arial"/>
-      <a:defRPr b="0" i="0" sz="1400" u="none" cap="none" strike="noStrike">
+      <a:defRPr sz="1400" b="0" i="0" u="none" strike="noStrike" cap="none">
         <a:solidFill>
           <a:srgbClr val="000000"/>
         </a:solidFill>
@@ -112,7 +112,7 @@
         <a:sym typeface="Arial"/>
       </a:defRPr>
     </a:lvl3pPr>
-    <a:lvl4pPr lvl="3" marR="0" rtl="0" algn="l">
+    <a:lvl4pPr marR="0" lvl="3" algn="l" rtl="0">
       <a:lnSpc>
         <a:spcPct val="100000"/>
       </a:lnSpc>
@@ -126,7 +126,7 @@
         <a:srgbClr val="000000"/>
       </a:buClr>
       <a:buFont typeface="Arial"/>
-      <a:defRPr b="0" i="0" sz="1400" u="none" cap="none" strike="noStrike">
+      <a:defRPr sz="1400" b="0" i="0" u="none" strike="noStrike" cap="none">
         <a:solidFill>
           <a:srgbClr val="000000"/>
         </a:solidFill>
@@ -136,7 +136,7 @@
         <a:sym typeface="Arial"/>
       </a:defRPr>
     </a:lvl4pPr>
-    <a:lvl5pPr lvl="4" marR="0" rtl="0" algn="l">
+    <a:lvl5pPr marR="0" lvl="4" algn="l" rtl="0">
       <a:lnSpc>
         <a:spcPct val="100000"/>
       </a:lnSpc>
@@ -150,7 +150,7 @@
         <a:srgbClr val="000000"/>
       </a:buClr>
       <a:buFont typeface="Arial"/>
-      <a:defRPr b="0" i="0" sz="1400" u="none" cap="none" strike="noStrike">
+      <a:defRPr sz="1400" b="0" i="0" u="none" strike="noStrike" cap="none">
         <a:solidFill>
           <a:srgbClr val="000000"/>
         </a:solidFill>
@@ -160,7 +160,7 @@
         <a:sym typeface="Arial"/>
       </a:defRPr>
     </a:lvl5pPr>
-    <a:lvl6pPr lvl="5" marR="0" rtl="0" algn="l">
+    <a:lvl6pPr marR="0" lvl="5" algn="l" rtl="0">
       <a:lnSpc>
         <a:spcPct val="100000"/>
       </a:lnSpc>
@@ -174,7 +174,7 @@
         <a:srgbClr val="000000"/>
       </a:buClr>
       <a:buFont typeface="Arial"/>
-      <a:defRPr b="0" i="0" sz="1400" u="none" cap="none" strike="noStrike">
+      <a:defRPr sz="1400" b="0" i="0" u="none" strike="noStrike" cap="none">
         <a:solidFill>
           <a:srgbClr val="000000"/>
         </a:solidFill>
@@ -184,7 +184,7 @@
         <a:sym typeface="Arial"/>
       </a:defRPr>
     </a:lvl6pPr>
-    <a:lvl7pPr lvl="6" marR="0" rtl="0" algn="l">
+    <a:lvl7pPr marR="0" lvl="6" algn="l" rtl="0">
       <a:lnSpc>
         <a:spcPct val="100000"/>
       </a:lnSpc>
@@ -198,7 +198,7 @@
         <a:srgbClr val="000000"/>
       </a:buClr>
       <a:buFont typeface="Arial"/>
-      <a:defRPr b="0" i="0" sz="1400" u="none" cap="none" strike="noStrike">
+      <a:defRPr sz="1400" b="0" i="0" u="none" strike="noStrike" cap="none">
         <a:solidFill>
           <a:srgbClr val="000000"/>
         </a:solidFill>
@@ -208,7 +208,7 @@
         <a:sym typeface="Arial"/>
       </a:defRPr>
     </a:lvl7pPr>
-    <a:lvl8pPr lvl="7" marR="0" rtl="0" algn="l">
+    <a:lvl8pPr marR="0" lvl="7" algn="l" rtl="0">
       <a:lnSpc>
         <a:spcPct val="100000"/>
       </a:lnSpc>
@@ -222,7 +222,7 @@
         <a:srgbClr val="000000"/>
       </a:buClr>
       <a:buFont typeface="Arial"/>
-      <a:defRPr b="0" i="0" sz="1400" u="none" cap="none" strike="noStrike">
+      <a:defRPr sz="1400" b="0" i="0" u="none" strike="noStrike" cap="none">
         <a:solidFill>
           <a:srgbClr val="000000"/>
         </a:solidFill>
@@ -232,7 +232,7 @@
         <a:sym typeface="Arial"/>
       </a:defRPr>
     </a:lvl8pPr>
-    <a:lvl9pPr lvl="8" marR="0" rtl="0" algn="l">
+    <a:lvl9pPr marR="0" lvl="8" algn="l" rtl="0">
       <a:lnSpc>
         <a:spcPct val="100000"/>
       </a:lnSpc>
@@ -246,7 +246,7 @@
         <a:srgbClr val="000000"/>
       </a:buClr>
       <a:buFont typeface="Arial"/>
-      <a:defRPr b="0" i="0" sz="1400" u="none" cap="none" strike="noStrike">
+      <a:defRPr sz="1400" b="0" i="0" u="none" strike="noStrike" cap="none">
         <a:solidFill>
           <a:srgbClr val="000000"/>
         </a:solidFill>
@@ -259,7 +259,7 @@
   </p:defaultTextStyle>
   <p:extLst>
     <p:ext uri="{EFAFB233-063F-42B5-8137-9DF3F51BA10A}">
-      <p15:sldGuideLst>
+      <p15:sldGuideLst xmlns:p15="http://schemas.microsoft.com/office/powerpoint/2012/main">
         <p15:guide id="1" orient="horz" pos="1620">
           <p15:clr>
             <a:srgbClr val="A4A3A4"/>
@@ -277,11 +277,16 @@
 </file>
 
 <file path=ppt/notesMasters/notesMaster1.xml><?xml version="1.0" encoding="utf-8"?>
-<p:notesMaster xmlns:a="http://schemas.openxmlformats.org/drawingml/2006/main" xmlns:r="http://schemas.openxmlformats.org/officeDocument/2006/relationships" xmlns:mc="http://schemas.openxmlformats.org/markup-compatibility/2006" xmlns:mv="urn:schemas-microsoft-com:mac:vml" xmlns:p="http://schemas.openxmlformats.org/presentationml/2006/main" xmlns:c="http://schemas.openxmlformats.org/drawingml/2006/chart" xmlns:dgm="http://schemas.openxmlformats.org/drawingml/2006/diagram" xmlns:o="urn:schemas-microsoft-com:office:office" xmlns:v="urn:schemas-microsoft-com:vml" xmlns:pvml="urn:schemas-microsoft-com:office:powerpoint" xmlns:com="http://schemas.openxmlformats.org/drawingml/2006/compatibility" xmlns:p14="http://schemas.microsoft.com/office/powerpoint/2010/main" xmlns:p15="http://schemas.microsoft.com/office/powerpoint/2012/main" xmlns:ahyp="http://schemas.microsoft.com/office/drawing/2018/hyperlinkcolor">
+<p:notesMaster xmlns:a="http://schemas.openxmlformats.org/drawingml/2006/main" xmlns:r="http://schemas.openxmlformats.org/officeDocument/2006/relationships" xmlns:p="http://schemas.openxmlformats.org/presentationml/2006/main">
   <p:cSld>
+    <p:bg>
+      <p:bgRef idx="1001">
+        <a:schemeClr val="bg1"/>
+      </p:bgRef>
+    </p:bg>
     <p:spTree>
       <p:nvGrpSpPr>
-        <p:cNvPr id="2" name="Shape 2"/>
+        <p:cNvPr id="1" name="Shape 2"/>
         <p:cNvGrpSpPr/>
         <p:nvPr/>
       </p:nvGrpSpPr>
@@ -296,9 +301,11 @@
       <p:sp>
         <p:nvSpPr>
           <p:cNvPr id="3" name="Google Shape;3;n"/>
-          <p:cNvSpPr/>
+          <p:cNvSpPr>
+            <a:spLocks noGrp="1" noRot="1" noChangeAspect="1"/>
+          </p:cNvSpPr>
           <p:nvPr>
-            <p:ph idx="2" type="sldImg"/>
+            <p:ph type="sldImg" idx="2"/>
           </p:nvPr>
         </p:nvSpPr>
         <p:spPr>
@@ -307,9 +314,13 @@
             <a:ext cx="6096075" cy="3429000"/>
           </a:xfrm>
           <a:custGeom>
-            <a:rect b="b" l="l" r="r" t="t"/>
+            <a:avLst/>
+            <a:gdLst/>
+            <a:ahLst/>
+            <a:cxnLst/>
+            <a:rect l="l" t="t" r="r" b="b"/>
             <a:pathLst>
-              <a:path extrusionOk="0" h="120000" w="120000">
+              <a:path w="120000" h="120000" extrusionOk="0">
                 <a:moveTo>
                   <a:pt x="0" y="0"/>
                 </a:moveTo>
@@ -327,23 +338,25 @@
             </a:pathLst>
           </a:custGeom>
           <a:noFill/>
-          <a:ln cap="flat" cmpd="sng" w="9525">
+          <a:ln w="9525" cap="flat" cmpd="sng">
             <a:solidFill>
               <a:srgbClr val="000000"/>
             </a:solidFill>
             <a:prstDash val="solid"/>
             <a:round/>
-            <a:headEnd len="sm" w="sm" type="none"/>
-            <a:tailEnd len="sm" w="sm" type="none"/>
+            <a:headEnd type="none" w="sm" len="sm"/>
+            <a:tailEnd type="none" w="sm" len="sm"/>
           </a:ln>
         </p:spPr>
       </p:sp>
       <p:sp>
         <p:nvSpPr>
           <p:cNvPr id="4" name="Google Shape;4;n"/>
-          <p:cNvSpPr txBox="1"/>
+          <p:cNvSpPr txBox="1">
+            <a:spLocks noGrp="1"/>
+          </p:cNvSpPr>
           <p:nvPr>
-            <p:ph idx="1" type="body"/>
+            <p:ph type="body" idx="1"/>
           </p:nvPr>
         </p:nvSpPr>
         <p:spPr>
@@ -360,11 +373,11 @@
           </a:ln>
         </p:spPr>
         <p:txBody>
-          <a:bodyPr anchorCtr="0" anchor="t" bIns="91425" lIns="91425" spcFirstLastPara="1" rIns="91425" wrap="square" tIns="91425">
+          <a:bodyPr spcFirstLastPara="1" wrap="square" lIns="91425" tIns="91425" rIns="91425" bIns="91425" anchor="t" anchorCtr="0">
             <a:noAutofit/>
           </a:bodyPr>
           <a:lstStyle>
-            <a:lvl1pPr indent="-317500" lvl="0" marL="457200">
+            <a:lvl1pPr marL="457200" lvl="0" indent="-317500">
               <a:spcBef>
                 <a:spcPts val="0"/>
               </a:spcBef>
@@ -375,7 +388,7 @@
               <a:buChar char="●"/>
               <a:defRPr sz="1100"/>
             </a:lvl1pPr>
-            <a:lvl2pPr indent="-317500" lvl="1" marL="914400">
+            <a:lvl2pPr marL="914400" lvl="1" indent="-317500">
               <a:spcBef>
                 <a:spcPts val="0"/>
               </a:spcBef>
@@ -386,7 +399,7 @@
               <a:buChar char="○"/>
               <a:defRPr sz="1100"/>
             </a:lvl2pPr>
-            <a:lvl3pPr indent="-317500" lvl="2" marL="1371600">
+            <a:lvl3pPr marL="1371600" lvl="2" indent="-317500">
               <a:spcBef>
                 <a:spcPts val="0"/>
               </a:spcBef>
@@ -397,7 +410,7 @@
               <a:buChar char="■"/>
               <a:defRPr sz="1100"/>
             </a:lvl3pPr>
-            <a:lvl4pPr indent="-317500" lvl="3" marL="1828800">
+            <a:lvl4pPr marL="1828800" lvl="3" indent="-317500">
               <a:spcBef>
                 <a:spcPts val="0"/>
               </a:spcBef>
@@ -408,7 +421,7 @@
               <a:buChar char="●"/>
               <a:defRPr sz="1100"/>
             </a:lvl4pPr>
-            <a:lvl5pPr indent="-317500" lvl="4" marL="2286000">
+            <a:lvl5pPr marL="2286000" lvl="4" indent="-317500">
               <a:spcBef>
                 <a:spcPts val="0"/>
               </a:spcBef>
@@ -419,7 +432,7 @@
               <a:buChar char="○"/>
               <a:defRPr sz="1100"/>
             </a:lvl5pPr>
-            <a:lvl6pPr indent="-317500" lvl="5" marL="2743200">
+            <a:lvl6pPr marL="2743200" lvl="5" indent="-317500">
               <a:spcBef>
                 <a:spcPts val="0"/>
               </a:spcBef>
@@ -430,7 +443,7 @@
               <a:buChar char="■"/>
               <a:defRPr sz="1100"/>
             </a:lvl6pPr>
-            <a:lvl7pPr indent="-317500" lvl="6" marL="3200400">
+            <a:lvl7pPr marL="3200400" lvl="6" indent="-317500">
               <a:spcBef>
                 <a:spcPts val="0"/>
               </a:spcBef>
@@ -441,7 +454,7 @@
               <a:buChar char="●"/>
               <a:defRPr sz="1100"/>
             </a:lvl7pPr>
-            <a:lvl8pPr indent="-317500" lvl="7" marL="3657600">
+            <a:lvl8pPr marL="3657600" lvl="7" indent="-317500">
               <a:spcBef>
                 <a:spcPts val="0"/>
               </a:spcBef>
@@ -452,7 +465,7 @@
               <a:buChar char="○"/>
               <a:defRPr sz="1100"/>
             </a:lvl8pPr>
-            <a:lvl9pPr indent="-317500" lvl="8" marL="4114800">
+            <a:lvl9pPr marL="4114800" lvl="8" indent="-317500">
               <a:spcBef>
                 <a:spcPts val="0"/>
               </a:spcBef>
@@ -464,14 +477,16 @@
               <a:defRPr sz="1100"/>
             </a:lvl9pPr>
           </a:lstStyle>
-          <a:p/>
+          <a:p>
+            <a:endParaRPr/>
+          </a:p>
         </p:txBody>
       </p:sp>
     </p:spTree>
   </p:cSld>
-  <p:clrMap accent1="accent1" accent2="accent2" accent3="accent3" accent4="accent4" accent5="accent5" accent6="accent6" bg1="lt1" bg2="dk2" tx1="dk1" tx2="lt2" folHlink="folHlink" hlink="hlink"/>
+  <p:clrMap bg1="lt1" tx1="dk1" bg2="dk2" tx2="lt2" accent1="accent1" accent2="accent2" accent3="accent3" accent4="accent4" accent5="accent5" accent6="accent6" hlink="hlink" folHlink="folHlink"/>
   <p:notesStyle>
-    <a:defPPr lvl="0" marR="0" rtl="0" algn="l">
+    <a:defPPr marR="0" lvl="0" algn="l" rtl="0">
       <a:lnSpc>
         <a:spcPct val="100000"/>
       </a:lnSpc>
@@ -482,7 +497,7 @@
         <a:spcPts val="0"/>
       </a:spcAft>
     </a:defPPr>
-    <a:lvl1pPr lvl="0" marR="0" rtl="0" algn="l">
+    <a:lvl1pPr marR="0" lvl="0" algn="l" rtl="0">
       <a:lnSpc>
         <a:spcPct val="100000"/>
       </a:lnSpc>
@@ -496,7 +511,7 @@
         <a:srgbClr val="000000"/>
       </a:buClr>
       <a:buFont typeface="Arial"/>
-      <a:defRPr b="0" i="0" sz="1400" u="none" cap="none" strike="noStrike">
+      <a:defRPr sz="1400" b="0" i="0" u="none" strike="noStrike" cap="none">
         <a:solidFill>
           <a:srgbClr val="000000"/>
         </a:solidFill>
@@ -506,7 +521,7 @@
         <a:sym typeface="Arial"/>
       </a:defRPr>
     </a:lvl1pPr>
-    <a:lvl2pPr lvl="1" marR="0" rtl="0" algn="l">
+    <a:lvl2pPr marR="0" lvl="1" algn="l" rtl="0">
       <a:lnSpc>
         <a:spcPct val="100000"/>
       </a:lnSpc>
@@ -520,7 +535,7 @@
         <a:srgbClr val="000000"/>
       </a:buClr>
       <a:buFont typeface="Arial"/>
-      <a:defRPr b="0" i="0" sz="1400" u="none" cap="none" strike="noStrike">
+      <a:defRPr sz="1400" b="0" i="0" u="none" strike="noStrike" cap="none">
         <a:solidFill>
           <a:srgbClr val="000000"/>
         </a:solidFill>
@@ -530,7 +545,7 @@
         <a:sym typeface="Arial"/>
       </a:defRPr>
     </a:lvl2pPr>
-    <a:lvl3pPr lvl="2" marR="0" rtl="0" algn="l">
+    <a:lvl3pPr marR="0" lvl="2" algn="l" rtl="0">
       <a:lnSpc>
         <a:spcPct val="100000"/>
       </a:lnSpc>
@@ -544,7 +559,7 @@
         <a:srgbClr val="000000"/>
       </a:buClr>
       <a:buFont typeface="Arial"/>
-      <a:defRPr b="0" i="0" sz="1400" u="none" cap="none" strike="noStrike">
+      <a:defRPr sz="1400" b="0" i="0" u="none" strike="noStrike" cap="none">
         <a:solidFill>
           <a:srgbClr val="000000"/>
         </a:solidFill>
@@ -554,7 +569,7 @@
         <a:sym typeface="Arial"/>
       </a:defRPr>
     </a:lvl3pPr>
-    <a:lvl4pPr lvl="3" marR="0" rtl="0" algn="l">
+    <a:lvl4pPr marR="0" lvl="3" algn="l" rtl="0">
       <a:lnSpc>
         <a:spcPct val="100000"/>
       </a:lnSpc>
@@ -568,7 +583,7 @@
         <a:srgbClr val="000000"/>
       </a:buClr>
       <a:buFont typeface="Arial"/>
-      <a:defRPr b="0" i="0" sz="1400" u="none" cap="none" strike="noStrike">
+      <a:defRPr sz="1400" b="0" i="0" u="none" strike="noStrike" cap="none">
         <a:solidFill>
           <a:srgbClr val="000000"/>
         </a:solidFill>
@@ -578,7 +593,7 @@
         <a:sym typeface="Arial"/>
       </a:defRPr>
     </a:lvl4pPr>
-    <a:lvl5pPr lvl="4" marR="0" rtl="0" algn="l">
+    <a:lvl5pPr marR="0" lvl="4" algn="l" rtl="0">
       <a:lnSpc>
         <a:spcPct val="100000"/>
       </a:lnSpc>
@@ -592,7 +607,7 @@
         <a:srgbClr val="000000"/>
       </a:buClr>
       <a:buFont typeface="Arial"/>
-      <a:defRPr b="0" i="0" sz="1400" u="none" cap="none" strike="noStrike">
+      <a:defRPr sz="1400" b="0" i="0" u="none" strike="noStrike" cap="none">
         <a:solidFill>
           <a:srgbClr val="000000"/>
         </a:solidFill>
@@ -602,7 +617,7 @@
         <a:sym typeface="Arial"/>
       </a:defRPr>
     </a:lvl5pPr>
-    <a:lvl6pPr lvl="5" marR="0" rtl="0" algn="l">
+    <a:lvl6pPr marR="0" lvl="5" algn="l" rtl="0">
       <a:lnSpc>
         <a:spcPct val="100000"/>
       </a:lnSpc>
@@ -616,7 +631,7 @@
         <a:srgbClr val="000000"/>
       </a:buClr>
       <a:buFont typeface="Arial"/>
-      <a:defRPr b="0" i="0" sz="1400" u="none" cap="none" strike="noStrike">
+      <a:defRPr sz="1400" b="0" i="0" u="none" strike="noStrike" cap="none">
         <a:solidFill>
           <a:srgbClr val="000000"/>
         </a:solidFill>
@@ -626,7 +641,7 @@
         <a:sym typeface="Arial"/>
       </a:defRPr>
     </a:lvl6pPr>
-    <a:lvl7pPr lvl="6" marR="0" rtl="0" algn="l">
+    <a:lvl7pPr marR="0" lvl="6" algn="l" rtl="0">
       <a:lnSpc>
         <a:spcPct val="100000"/>
       </a:lnSpc>
@@ -640,7 +655,7 @@
         <a:srgbClr val="000000"/>
       </a:buClr>
       <a:buFont typeface="Arial"/>
-      <a:defRPr b="0" i="0" sz="1400" u="none" cap="none" strike="noStrike">
+      <a:defRPr sz="1400" b="0" i="0" u="none" strike="noStrike" cap="none">
         <a:solidFill>
           <a:srgbClr val="000000"/>
         </a:solidFill>
@@ -650,7 +665,7 @@
         <a:sym typeface="Arial"/>
       </a:defRPr>
     </a:lvl7pPr>
-    <a:lvl8pPr lvl="7" marR="0" rtl="0" algn="l">
+    <a:lvl8pPr marR="0" lvl="7" algn="l" rtl="0">
       <a:lnSpc>
         <a:spcPct val="100000"/>
       </a:lnSpc>
@@ -664,7 +679,7 @@
         <a:srgbClr val="000000"/>
       </a:buClr>
       <a:buFont typeface="Arial"/>
-      <a:defRPr b="0" i="0" sz="1400" u="none" cap="none" strike="noStrike">
+      <a:defRPr sz="1400" b="0" i="0" u="none" strike="noStrike" cap="none">
         <a:solidFill>
           <a:srgbClr val="000000"/>
         </a:solidFill>
@@ -674,7 +689,7 @@
         <a:sym typeface="Arial"/>
       </a:defRPr>
     </a:lvl8pPr>
-    <a:lvl9pPr lvl="8" marR="0" rtl="0" algn="l">
+    <a:lvl9pPr marR="0" lvl="8" algn="l" rtl="0">
       <a:lnSpc>
         <a:spcPct val="100000"/>
       </a:lnSpc>
@@ -688,7 +703,7 @@
         <a:srgbClr val="000000"/>
       </a:buClr>
       <a:buFont typeface="Arial"/>
-      <a:defRPr b="0" i="0" sz="1400" u="none" cap="none" strike="noStrike">
+      <a:defRPr sz="1400" b="0" i="0" u="none" strike="noStrike" cap="none">
         <a:solidFill>
           <a:srgbClr val="000000"/>
         </a:solidFill>
@@ -703,11 +718,11 @@
 </file>
 
 <file path=ppt/notesSlides/notesSlide1.xml><?xml version="1.0" encoding="utf-8"?>
-<p:notes xmlns:a="http://schemas.openxmlformats.org/drawingml/2006/main" xmlns:r="http://schemas.openxmlformats.org/officeDocument/2006/relationships" xmlns:mc="http://schemas.openxmlformats.org/markup-compatibility/2006" xmlns:mv="urn:schemas-microsoft-com:mac:vml" xmlns:p="http://schemas.openxmlformats.org/presentationml/2006/main" xmlns:c="http://schemas.openxmlformats.org/drawingml/2006/chart" xmlns:dgm="http://schemas.openxmlformats.org/drawingml/2006/diagram" xmlns:o="urn:schemas-microsoft-com:office:office" xmlns:v="urn:schemas-microsoft-com:vml" xmlns:pvml="urn:schemas-microsoft-com:office:powerpoint" xmlns:com="http://schemas.openxmlformats.org/drawingml/2006/compatibility" xmlns:p14="http://schemas.microsoft.com/office/powerpoint/2010/main" xmlns:p15="http://schemas.microsoft.com/office/powerpoint/2012/main" xmlns:ahyp="http://schemas.microsoft.com/office/drawing/2018/hyperlinkcolor" showMasterPhAnim="0" showMasterSp="0">
+<p:notes xmlns:a="http://schemas.openxmlformats.org/drawingml/2006/main" xmlns:r="http://schemas.openxmlformats.org/officeDocument/2006/relationships" xmlns:p="http://schemas.openxmlformats.org/presentationml/2006/main" showMasterSp="0" showMasterPhAnim="0">
   <p:cSld>
     <p:spTree>
       <p:nvGrpSpPr>
-        <p:cNvPr id="58" name="Shape 58"/>
+        <p:cNvPr id="1" name="Shape 58"/>
         <p:cNvGrpSpPr/>
         <p:nvPr/>
       </p:nvGrpSpPr>
@@ -722,20 +737,26 @@
       <p:sp>
         <p:nvSpPr>
           <p:cNvPr id="59" name="Google Shape;59;gc6f8954bc_0_96:notes"/>
-          <p:cNvSpPr/>
+          <p:cNvSpPr>
+            <a:spLocks noGrp="1" noRot="1" noChangeAspect="1"/>
+          </p:cNvSpPr>
           <p:nvPr>
-            <p:ph idx="2" type="sldImg"/>
+            <p:ph type="sldImg" idx="2"/>
           </p:nvPr>
         </p:nvSpPr>
         <p:spPr>
           <a:xfrm>
-            <a:off x="381188" y="685800"/>
-            <a:ext cx="6096300" cy="3429000"/>
+            <a:off x="381000" y="685800"/>
+            <a:ext cx="6096000" cy="3429000"/>
           </a:xfrm>
           <a:custGeom>
-            <a:rect b="b" l="l" r="r" t="t"/>
+            <a:avLst/>
+            <a:gdLst/>
+            <a:ahLst/>
+            <a:cxnLst/>
+            <a:rect l="l" t="t" r="r" b="b"/>
             <a:pathLst>
-              <a:path extrusionOk="0" h="120000" w="120000">
+              <a:path w="120000" h="120000" extrusionOk="0">
                 <a:moveTo>
                   <a:pt x="0" y="0"/>
                 </a:moveTo>
@@ -757,9 +778,11 @@
       <p:sp>
         <p:nvSpPr>
           <p:cNvPr id="60" name="Google Shape;60;gc6f8954bc_0_96:notes"/>
-          <p:cNvSpPr txBox="1"/>
+          <p:cNvSpPr txBox="1">
+            <a:spLocks noGrp="1"/>
+          </p:cNvSpPr>
           <p:nvPr>
-            <p:ph idx="1" type="body"/>
+            <p:ph type="body" idx="1"/>
           </p:nvPr>
         </p:nvSpPr>
         <p:spPr>
@@ -772,12 +795,12 @@
           </a:prstGeom>
         </p:spPr>
         <p:txBody>
-          <a:bodyPr anchorCtr="0" anchor="t" bIns="91425" lIns="91425" spcFirstLastPara="1" rIns="91425" wrap="square" tIns="91425">
+          <a:bodyPr spcFirstLastPara="1" wrap="square" lIns="91425" tIns="91425" rIns="91425" bIns="91425" anchor="t" anchorCtr="0">
             <a:noAutofit/>
           </a:bodyPr>
           <a:lstStyle/>
           <a:p>
-            <a:pPr indent="0" lvl="0" marL="0" rtl="0" algn="l">
+            <a:pPr marL="0" lvl="0" indent="0" algn="l" rtl="0">
               <a:spcBef>
                 <a:spcPts val="0"/>
               </a:spcBef>
@@ -787,7 +810,12 @@
               <a:buNone/>
             </a:pPr>
             <a:r>
-              <a:t/>
+              <a:rPr lang="en-US" dirty="0"/>
+              <a:t>I’m not sure we have the data to answer the “Who</a:t>
+            </a:r>
+            <a:r>
+              <a:rPr lang="en-US"/>
+              <a:t>” Questions?</a:t>
             </a:r>
             <a:endParaRPr/>
           </a:p>
@@ -802,11 +830,11 @@
 </file>
 
 <file path=ppt/slideLayouts/slideLayout1.xml><?xml version="1.0" encoding="utf-8"?>
-<p:sldLayout xmlns:a="http://schemas.openxmlformats.org/drawingml/2006/main" xmlns:r="http://schemas.openxmlformats.org/officeDocument/2006/relationships" xmlns:mc="http://schemas.openxmlformats.org/markup-compatibility/2006" xmlns:mv="urn:schemas-microsoft-com:mac:vml" xmlns:p="http://schemas.openxmlformats.org/presentationml/2006/main" xmlns:c="http://schemas.openxmlformats.org/drawingml/2006/chart" xmlns:dgm="http://schemas.openxmlformats.org/drawingml/2006/diagram" xmlns:o="urn:schemas-microsoft-com:office:office" xmlns:v="urn:schemas-microsoft-com:vml" xmlns:pvml="urn:schemas-microsoft-com:office:powerpoint" xmlns:com="http://schemas.openxmlformats.org/drawingml/2006/compatibility" xmlns:p14="http://schemas.microsoft.com/office/powerpoint/2010/main" xmlns:p15="http://schemas.microsoft.com/office/powerpoint/2012/main" xmlns:ahyp="http://schemas.microsoft.com/office/drawing/2018/hyperlinkcolor" matchingName="Title slide" type="title">
+<p:sldLayout xmlns:a="http://schemas.openxmlformats.org/drawingml/2006/main" xmlns:r="http://schemas.openxmlformats.org/officeDocument/2006/relationships" xmlns:p="http://schemas.openxmlformats.org/presentationml/2006/main" matchingName="Title slide" type="title">
   <p:cSld name="TITLE">
     <p:spTree>
       <p:nvGrpSpPr>
-        <p:cNvPr id="9" name="Shape 9"/>
+        <p:cNvPr id="1" name="Shape 9"/>
         <p:cNvGrpSpPr/>
         <p:nvPr/>
       </p:nvGrpSpPr>
@@ -830,9 +858,13 @@
             <a:ext cx="1081625" cy="1124950"/>
           </a:xfrm>
           <a:custGeom>
-            <a:rect b="b" l="l" r="r" t="t"/>
+            <a:avLst/>
+            <a:gdLst/>
+            <a:ahLst/>
+            <a:cxnLst/>
+            <a:rect l="l" t="t" r="r" b="b"/>
             <a:pathLst>
-              <a:path extrusionOk="0" h="44998" w="43265">
+              <a:path w="43265" h="44998" extrusionOk="0">
                 <a:moveTo>
                   <a:pt x="0" y="44998"/>
                 </a:moveTo>
@@ -846,14 +878,14 @@
             </a:pathLst>
           </a:custGeom>
           <a:noFill/>
-          <a:ln cap="flat" cmpd="sng" w="28575">
+          <a:ln w="28575" cap="flat" cmpd="sng">
             <a:solidFill>
               <a:schemeClr val="lt2"/>
             </a:solidFill>
             <a:prstDash val="solid"/>
             <a:miter lim="8000"/>
-            <a:headEnd len="sm" w="sm" type="none"/>
-            <a:tailEnd len="sm" w="sm" type="none"/>
+            <a:headEnd type="none" w="sm" len="sm"/>
+            <a:tailEnd type="none" w="sm" len="sm"/>
           </a:ln>
         </p:spPr>
       </p:sp>
@@ -869,9 +901,13 @@
             <a:ext cx="1081625" cy="1124950"/>
           </a:xfrm>
           <a:custGeom>
-            <a:rect b="b" l="l" r="r" t="t"/>
+            <a:avLst/>
+            <a:gdLst/>
+            <a:ahLst/>
+            <a:cxnLst/>
+            <a:rect l="l" t="t" r="r" b="b"/>
             <a:pathLst>
-              <a:path extrusionOk="0" h="44998" w="43265">
+              <a:path w="43265" h="44998" extrusionOk="0">
                 <a:moveTo>
                   <a:pt x="0" y="44998"/>
                 </a:moveTo>
@@ -885,21 +921,23 @@
             </a:pathLst>
           </a:custGeom>
           <a:noFill/>
-          <a:ln cap="flat" cmpd="sng" w="28575">
+          <a:ln w="28575" cap="flat" cmpd="sng">
             <a:solidFill>
               <a:schemeClr val="lt2"/>
             </a:solidFill>
             <a:prstDash val="solid"/>
             <a:miter lim="8000"/>
-            <a:headEnd len="sm" w="sm" type="none"/>
-            <a:tailEnd len="sm" w="sm" type="none"/>
+            <a:headEnd type="none" w="sm" len="sm"/>
+            <a:tailEnd type="none" w="sm" len="sm"/>
           </a:ln>
         </p:spPr>
       </p:sp>
       <p:sp>
         <p:nvSpPr>
           <p:cNvPr id="12" name="Google Shape;12;p2"/>
-          <p:cNvSpPr txBox="1"/>
+          <p:cNvSpPr txBox="1">
+            <a:spLocks noGrp="1"/>
+          </p:cNvSpPr>
           <p:nvPr>
             <p:ph type="ctrTitle"/>
           </p:nvPr>
@@ -914,7 +952,7 @@
           </a:prstGeom>
         </p:spPr>
         <p:txBody>
-          <a:bodyPr anchorCtr="0" anchor="b" bIns="91425" lIns="91425" spcFirstLastPara="1" rIns="91425" wrap="square" tIns="91425">
+          <a:bodyPr spcFirstLastPara="1" wrap="square" lIns="91425" tIns="91425" rIns="91425" bIns="91425" anchor="b" anchorCtr="0">
             <a:noAutofit/>
           </a:bodyPr>
           <a:lstStyle>
@@ -1018,15 +1056,19 @@
               <a:defRPr/>
             </a:lvl9pPr>
           </a:lstStyle>
-          <a:p/>
+          <a:p>
+            <a:endParaRPr/>
+          </a:p>
         </p:txBody>
       </p:sp>
       <p:sp>
         <p:nvSpPr>
           <p:cNvPr id="13" name="Google Shape;13;p2"/>
-          <p:cNvSpPr txBox="1"/>
+          <p:cNvSpPr txBox="1">
+            <a:spLocks noGrp="1"/>
+          </p:cNvSpPr>
           <p:nvPr>
-            <p:ph idx="1" type="subTitle"/>
+            <p:ph type="subTitle" idx="1"/>
           </p:nvPr>
         </p:nvSpPr>
         <p:spPr>
@@ -1039,7 +1081,7 @@
           </a:prstGeom>
         </p:spPr>
         <p:txBody>
-          <a:bodyPr anchorCtr="0" anchor="t" bIns="91425" lIns="91425" spcFirstLastPara="1" rIns="91425" wrap="square" tIns="91425">
+          <a:bodyPr spcFirstLastPara="1" wrap="square" lIns="91425" tIns="91425" rIns="91425" bIns="91425" anchor="t" anchorCtr="0">
             <a:noAutofit/>
           </a:bodyPr>
           <a:lstStyle>
@@ -1224,15 +1266,19 @@
               </a:defRPr>
             </a:lvl9pPr>
           </a:lstStyle>
-          <a:p/>
+          <a:p>
+            <a:endParaRPr/>
+          </a:p>
         </p:txBody>
       </p:sp>
       <p:sp>
         <p:nvSpPr>
           <p:cNvPr id="14" name="Google Shape;14;p2"/>
-          <p:cNvSpPr txBox="1"/>
+          <p:cNvSpPr txBox="1">
+            <a:spLocks noGrp="1"/>
+          </p:cNvSpPr>
           <p:nvPr>
-            <p:ph idx="12" type="sldNum"/>
+            <p:ph type="sldNum" idx="12"/>
           </p:nvPr>
         </p:nvSpPr>
         <p:spPr>
@@ -1245,7 +1291,7 @@
           </a:prstGeom>
         </p:spPr>
         <p:txBody>
-          <a:bodyPr anchorCtr="0" anchor="ctr" bIns="91425" lIns="91425" spcFirstLastPara="1" rIns="91425" wrap="square" tIns="91425">
+          <a:bodyPr spcFirstLastPara="1" wrap="square" lIns="91425" tIns="91425" rIns="91425" bIns="91425" anchor="ctr" anchorCtr="0">
             <a:noAutofit/>
           </a:bodyPr>
           <a:lstStyle>
@@ -1287,7 +1333,7 @@
             </a:lvl9pPr>
           </a:lstStyle>
           <a:p>
-            <a:pPr indent="0" lvl="0" marL="0" rtl="0" algn="r">
+            <a:pPr marL="0" lvl="0" indent="0" algn="r" rtl="0">
               <a:spcBef>
                 <a:spcPts val="0"/>
               </a:spcBef>
@@ -1313,11 +1359,11 @@
 </file>
 
 <file path=ppt/slideLayouts/slideLayout10.xml><?xml version="1.0" encoding="utf-8"?>
-<p:sldLayout xmlns:a="http://schemas.openxmlformats.org/drawingml/2006/main" xmlns:r="http://schemas.openxmlformats.org/officeDocument/2006/relationships" xmlns:mc="http://schemas.openxmlformats.org/markup-compatibility/2006" xmlns:mv="urn:schemas-microsoft-com:mac:vml" xmlns:p="http://schemas.openxmlformats.org/presentationml/2006/main" xmlns:c="http://schemas.openxmlformats.org/drawingml/2006/chart" xmlns:dgm="http://schemas.openxmlformats.org/drawingml/2006/diagram" xmlns:o="urn:schemas-microsoft-com:office:office" xmlns:v="urn:schemas-microsoft-com:vml" xmlns:pvml="urn:schemas-microsoft-com:office:powerpoint" xmlns:com="http://schemas.openxmlformats.org/drawingml/2006/compatibility" xmlns:p14="http://schemas.microsoft.com/office/powerpoint/2010/main" xmlns:p15="http://schemas.microsoft.com/office/powerpoint/2012/main" xmlns:ahyp="http://schemas.microsoft.com/office/drawing/2018/hyperlinkcolor" matchingName="Big number">
+<p:sldLayout xmlns:a="http://schemas.openxmlformats.org/drawingml/2006/main" xmlns:r="http://schemas.openxmlformats.org/officeDocument/2006/relationships" xmlns:p="http://schemas.openxmlformats.org/presentationml/2006/main" matchingName="Big number">
   <p:cSld name="BIG_NUMBER">
     <p:spTree>
       <p:nvGrpSpPr>
-        <p:cNvPr id="51" name="Shape 51"/>
+        <p:cNvPr id="1" name="Shape 51"/>
         <p:cNvGrpSpPr/>
         <p:nvPr/>
       </p:nvGrpSpPr>
@@ -1351,12 +1397,12 @@
           </a:ln>
         </p:spPr>
         <p:txBody>
-          <a:bodyPr anchorCtr="0" anchor="ctr" bIns="91425" lIns="91425" spcFirstLastPara="1" rIns="91425" wrap="square" tIns="91425">
+          <a:bodyPr spcFirstLastPara="1" wrap="square" lIns="91425" tIns="91425" rIns="91425" bIns="91425" anchor="ctr" anchorCtr="0">
             <a:noAutofit/>
           </a:bodyPr>
           <a:lstStyle/>
           <a:p>
-            <a:pPr indent="0" lvl="0" marL="0" rtl="0" algn="l">
+            <a:pPr marL="0" lvl="0" indent="0" algn="l" rtl="0">
               <a:spcBef>
                 <a:spcPts val="0"/>
               </a:spcBef>
@@ -1365,9 +1411,6 @@
               </a:spcAft>
               <a:buNone/>
             </a:pPr>
-            <a:r>
-              <a:t/>
-            </a:r>
             <a:endParaRPr/>
           </a:p>
         </p:txBody>
@@ -1375,9 +1418,11 @@
       <p:sp>
         <p:nvSpPr>
           <p:cNvPr id="53" name="Google Shape;53;p11"/>
-          <p:cNvSpPr txBox="1"/>
+          <p:cNvSpPr txBox="1">
+            <a:spLocks noGrp="1"/>
+          </p:cNvSpPr>
           <p:nvPr>
-            <p:ph hasCustomPrompt="1" type="title"/>
+            <p:ph type="title" hasCustomPrompt="1"/>
           </p:nvPr>
         </p:nvSpPr>
         <p:spPr>
@@ -1390,7 +1435,7 @@
           </a:prstGeom>
         </p:spPr>
         <p:txBody>
-          <a:bodyPr anchorCtr="0" anchor="ctr" bIns="91425" lIns="91425" spcFirstLastPara="1" rIns="91425" wrap="square" tIns="91425">
+          <a:bodyPr spcFirstLastPara="1" wrap="square" lIns="91425" tIns="91425" rIns="91425" bIns="91425" anchor="ctr" anchorCtr="0">
             <a:noAutofit/>
           </a:bodyPr>
           <a:lstStyle>
@@ -1567,9 +1612,11 @@
       <p:sp>
         <p:nvSpPr>
           <p:cNvPr id="54" name="Google Shape;54;p11"/>
-          <p:cNvSpPr txBox="1"/>
+          <p:cNvSpPr txBox="1">
+            <a:spLocks noGrp="1"/>
+          </p:cNvSpPr>
           <p:nvPr>
-            <p:ph idx="1" type="body"/>
+            <p:ph type="body" idx="1"/>
           </p:nvPr>
         </p:nvSpPr>
         <p:spPr>
@@ -1582,11 +1629,11 @@
           </a:prstGeom>
         </p:spPr>
         <p:txBody>
-          <a:bodyPr anchorCtr="0" anchor="t" bIns="91425" lIns="91425" spcFirstLastPara="1" rIns="91425" wrap="square" tIns="91425">
+          <a:bodyPr spcFirstLastPara="1" wrap="square" lIns="91425" tIns="91425" rIns="91425" bIns="91425" anchor="t" anchorCtr="0">
             <a:noAutofit/>
           </a:bodyPr>
           <a:lstStyle>
-            <a:lvl1pPr indent="-342900" lvl="0" marL="457200" algn="ctr">
+            <a:lvl1pPr marL="457200" lvl="0" indent="-342900" algn="ctr">
               <a:spcBef>
                 <a:spcPts val="0"/>
               </a:spcBef>
@@ -1597,7 +1644,7 @@
               <a:buChar char="●"/>
               <a:defRPr/>
             </a:lvl1pPr>
-            <a:lvl2pPr indent="-317500" lvl="1" marL="914400" algn="ctr">
+            <a:lvl2pPr marL="914400" lvl="1" indent="-317500" algn="ctr">
               <a:spcBef>
                 <a:spcPts val="1600"/>
               </a:spcBef>
@@ -1608,7 +1655,7 @@
               <a:buChar char="○"/>
               <a:defRPr/>
             </a:lvl2pPr>
-            <a:lvl3pPr indent="-317500" lvl="2" marL="1371600" algn="ctr">
+            <a:lvl3pPr marL="1371600" lvl="2" indent="-317500" algn="ctr">
               <a:spcBef>
                 <a:spcPts val="1600"/>
               </a:spcBef>
@@ -1619,7 +1666,7 @@
               <a:buChar char="■"/>
               <a:defRPr/>
             </a:lvl3pPr>
-            <a:lvl4pPr indent="-317500" lvl="3" marL="1828800" algn="ctr">
+            <a:lvl4pPr marL="1828800" lvl="3" indent="-317500" algn="ctr">
               <a:spcBef>
                 <a:spcPts val="1600"/>
               </a:spcBef>
@@ -1630,7 +1677,7 @@
               <a:buChar char="●"/>
               <a:defRPr/>
             </a:lvl4pPr>
-            <a:lvl5pPr indent="-317500" lvl="4" marL="2286000" algn="ctr">
+            <a:lvl5pPr marL="2286000" lvl="4" indent="-317500" algn="ctr">
               <a:spcBef>
                 <a:spcPts val="1600"/>
               </a:spcBef>
@@ -1641,7 +1688,7 @@
               <a:buChar char="○"/>
               <a:defRPr/>
             </a:lvl5pPr>
-            <a:lvl6pPr indent="-317500" lvl="5" marL="2743200" algn="ctr">
+            <a:lvl6pPr marL="2743200" lvl="5" indent="-317500" algn="ctr">
               <a:spcBef>
                 <a:spcPts val="1600"/>
               </a:spcBef>
@@ -1652,7 +1699,7 @@
               <a:buChar char="■"/>
               <a:defRPr/>
             </a:lvl6pPr>
-            <a:lvl7pPr indent="-317500" lvl="6" marL="3200400" algn="ctr">
+            <a:lvl7pPr marL="3200400" lvl="6" indent="-317500" algn="ctr">
               <a:spcBef>
                 <a:spcPts val="1600"/>
               </a:spcBef>
@@ -1663,7 +1710,7 @@
               <a:buChar char="●"/>
               <a:defRPr/>
             </a:lvl7pPr>
-            <a:lvl8pPr indent="-317500" lvl="7" marL="3657600" algn="ctr">
+            <a:lvl8pPr marL="3657600" lvl="7" indent="-317500" algn="ctr">
               <a:spcBef>
                 <a:spcPts val="1600"/>
               </a:spcBef>
@@ -1674,7 +1721,7 @@
               <a:buChar char="○"/>
               <a:defRPr/>
             </a:lvl8pPr>
-            <a:lvl9pPr indent="-317500" lvl="8" marL="4114800" algn="ctr">
+            <a:lvl9pPr marL="4114800" lvl="8" indent="-317500" algn="ctr">
               <a:spcBef>
                 <a:spcPts val="1600"/>
               </a:spcBef>
@@ -1686,15 +1733,19 @@
               <a:defRPr/>
             </a:lvl9pPr>
           </a:lstStyle>
-          <a:p/>
+          <a:p>
+            <a:endParaRPr/>
+          </a:p>
         </p:txBody>
       </p:sp>
       <p:sp>
         <p:nvSpPr>
           <p:cNvPr id="55" name="Google Shape;55;p11"/>
-          <p:cNvSpPr txBox="1"/>
+          <p:cNvSpPr txBox="1">
+            <a:spLocks noGrp="1"/>
+          </p:cNvSpPr>
           <p:nvPr>
-            <p:ph idx="12" type="sldNum"/>
+            <p:ph type="sldNum" idx="12"/>
           </p:nvPr>
         </p:nvSpPr>
         <p:spPr>
@@ -1707,7 +1758,7 @@
           </a:prstGeom>
         </p:spPr>
         <p:txBody>
-          <a:bodyPr anchorCtr="0" anchor="ctr" bIns="91425" lIns="91425" spcFirstLastPara="1" rIns="91425" wrap="square" tIns="91425">
+          <a:bodyPr spcFirstLastPara="1" wrap="square" lIns="91425" tIns="91425" rIns="91425" bIns="91425" anchor="ctr" anchorCtr="0">
             <a:noAutofit/>
           </a:bodyPr>
           <a:lstStyle>
@@ -1749,7 +1800,7 @@
             </a:lvl9pPr>
           </a:lstStyle>
           <a:p>
-            <a:pPr indent="0" lvl="0" marL="0" rtl="0" algn="r">
+            <a:pPr marL="0" lvl="0" indent="0" algn="r" rtl="0">
               <a:spcBef>
                 <a:spcPts val="0"/>
               </a:spcBef>
@@ -1775,11 +1826,11 @@
 </file>
 
 <file path=ppt/slideLayouts/slideLayout11.xml><?xml version="1.0" encoding="utf-8"?>
-<p:sldLayout xmlns:a="http://schemas.openxmlformats.org/drawingml/2006/main" xmlns:r="http://schemas.openxmlformats.org/officeDocument/2006/relationships" xmlns:mc="http://schemas.openxmlformats.org/markup-compatibility/2006" xmlns:mv="urn:schemas-microsoft-com:mac:vml" xmlns:p="http://schemas.openxmlformats.org/presentationml/2006/main" xmlns:c="http://schemas.openxmlformats.org/drawingml/2006/chart" xmlns:dgm="http://schemas.openxmlformats.org/drawingml/2006/diagram" xmlns:o="urn:schemas-microsoft-com:office:office" xmlns:v="urn:schemas-microsoft-com:vml" xmlns:pvml="urn:schemas-microsoft-com:office:powerpoint" xmlns:com="http://schemas.openxmlformats.org/drawingml/2006/compatibility" xmlns:p14="http://schemas.microsoft.com/office/powerpoint/2010/main" xmlns:p15="http://schemas.microsoft.com/office/powerpoint/2012/main" xmlns:ahyp="http://schemas.microsoft.com/office/drawing/2018/hyperlinkcolor" matchingName="Blank" type="blank">
+<p:sldLayout xmlns:a="http://schemas.openxmlformats.org/drawingml/2006/main" xmlns:r="http://schemas.openxmlformats.org/officeDocument/2006/relationships" xmlns:p="http://schemas.openxmlformats.org/presentationml/2006/main" matchingName="Blank" type="blank">
   <p:cSld name="BLANK">
     <p:spTree>
       <p:nvGrpSpPr>
-        <p:cNvPr id="56" name="Shape 56"/>
+        <p:cNvPr id="1" name="Shape 56"/>
         <p:cNvGrpSpPr/>
         <p:nvPr/>
       </p:nvGrpSpPr>
@@ -1794,9 +1845,11 @@
       <p:sp>
         <p:nvSpPr>
           <p:cNvPr id="57" name="Google Shape;57;p12"/>
-          <p:cNvSpPr txBox="1"/>
+          <p:cNvSpPr txBox="1">
+            <a:spLocks noGrp="1"/>
+          </p:cNvSpPr>
           <p:nvPr>
-            <p:ph idx="12" type="sldNum"/>
+            <p:ph type="sldNum" idx="12"/>
           </p:nvPr>
         </p:nvSpPr>
         <p:spPr>
@@ -1809,7 +1862,7 @@
           </a:prstGeom>
         </p:spPr>
         <p:txBody>
-          <a:bodyPr anchorCtr="0" anchor="ctr" bIns="91425" lIns="91425" spcFirstLastPara="1" rIns="91425" wrap="square" tIns="91425">
+          <a:bodyPr spcFirstLastPara="1" wrap="square" lIns="91425" tIns="91425" rIns="91425" bIns="91425" anchor="ctr" anchorCtr="0">
             <a:noAutofit/>
           </a:bodyPr>
           <a:lstStyle>
@@ -1851,7 +1904,7 @@
             </a:lvl9pPr>
           </a:lstStyle>
           <a:p>
-            <a:pPr indent="0" lvl="0" marL="0" rtl="0" algn="r">
+            <a:pPr marL="0" lvl="0" indent="0" algn="r" rtl="0">
               <a:spcBef>
                 <a:spcPts val="0"/>
               </a:spcBef>
@@ -1877,11 +1930,11 @@
 </file>
 
 <file path=ppt/slideLayouts/slideLayout2.xml><?xml version="1.0" encoding="utf-8"?>
-<p:sldLayout xmlns:a="http://schemas.openxmlformats.org/drawingml/2006/main" xmlns:r="http://schemas.openxmlformats.org/officeDocument/2006/relationships" xmlns:mc="http://schemas.openxmlformats.org/markup-compatibility/2006" xmlns:mv="urn:schemas-microsoft-com:mac:vml" xmlns:p="http://schemas.openxmlformats.org/presentationml/2006/main" xmlns:c="http://schemas.openxmlformats.org/drawingml/2006/chart" xmlns:dgm="http://schemas.openxmlformats.org/drawingml/2006/diagram" xmlns:o="urn:schemas-microsoft-com:office:office" xmlns:v="urn:schemas-microsoft-com:vml" xmlns:pvml="urn:schemas-microsoft-com:office:powerpoint" xmlns:com="http://schemas.openxmlformats.org/drawingml/2006/compatibility" xmlns:p14="http://schemas.microsoft.com/office/powerpoint/2010/main" xmlns:p15="http://schemas.microsoft.com/office/powerpoint/2012/main" xmlns:ahyp="http://schemas.microsoft.com/office/drawing/2018/hyperlinkcolor" matchingName="Section header" type="secHead">
+<p:sldLayout xmlns:a="http://schemas.openxmlformats.org/drawingml/2006/main" xmlns:r="http://schemas.openxmlformats.org/officeDocument/2006/relationships" xmlns:p="http://schemas.openxmlformats.org/presentationml/2006/main" matchingName="Section header" type="secHead">
   <p:cSld name="SECTION_HEADER">
     <p:spTree>
       <p:nvGrpSpPr>
-        <p:cNvPr id="15" name="Shape 15"/>
+        <p:cNvPr id="1" name="Shape 15"/>
         <p:cNvGrpSpPr/>
         <p:nvPr/>
       </p:nvGrpSpPr>
@@ -1905,9 +1958,13 @@
             <a:ext cx="1081625" cy="1124950"/>
           </a:xfrm>
           <a:custGeom>
-            <a:rect b="b" l="l" r="r" t="t"/>
+            <a:avLst/>
+            <a:gdLst/>
+            <a:ahLst/>
+            <a:cxnLst/>
+            <a:rect l="l" t="t" r="r" b="b"/>
             <a:pathLst>
-              <a:path extrusionOk="0" h="44998" w="43265">
+              <a:path w="43265" h="44998" extrusionOk="0">
                 <a:moveTo>
                   <a:pt x="0" y="44998"/>
                 </a:moveTo>
@@ -1921,14 +1978,14 @@
             </a:pathLst>
           </a:custGeom>
           <a:noFill/>
-          <a:ln cap="flat" cmpd="sng" w="28575">
+          <a:ln w="28575" cap="flat" cmpd="sng">
             <a:solidFill>
               <a:schemeClr val="lt2"/>
             </a:solidFill>
             <a:prstDash val="solid"/>
             <a:miter lim="8000"/>
-            <a:headEnd len="sm" w="sm" type="none"/>
-            <a:tailEnd len="sm" w="sm" type="none"/>
+            <a:headEnd type="none" w="sm" len="sm"/>
+            <a:tailEnd type="none" w="sm" len="sm"/>
           </a:ln>
         </p:spPr>
       </p:sp>
@@ -1939,14 +1996,18 @@
           <p:nvPr/>
         </p:nvSpPr>
         <p:spPr>
-          <a:xfrm flipH="1" rot="10800000">
+          <a:xfrm rot="10800000" flipH="1">
             <a:off x="466425" y="3558325"/>
             <a:ext cx="1081625" cy="1124950"/>
           </a:xfrm>
           <a:custGeom>
-            <a:rect b="b" l="l" r="r" t="t"/>
+            <a:avLst/>
+            <a:gdLst/>
+            <a:ahLst/>
+            <a:cxnLst/>
+            <a:rect l="l" t="t" r="r" b="b"/>
             <a:pathLst>
-              <a:path extrusionOk="0" h="44998" w="43265">
+              <a:path w="43265" h="44998" extrusionOk="0">
                 <a:moveTo>
                   <a:pt x="0" y="44998"/>
                 </a:moveTo>
@@ -1960,21 +2021,23 @@
             </a:pathLst>
           </a:custGeom>
           <a:noFill/>
-          <a:ln cap="flat" cmpd="sng" w="28575">
+          <a:ln w="28575" cap="flat" cmpd="sng">
             <a:solidFill>
               <a:schemeClr val="lt2"/>
             </a:solidFill>
             <a:prstDash val="solid"/>
             <a:miter lim="8000"/>
-            <a:headEnd len="sm" w="sm" type="none"/>
-            <a:tailEnd len="sm" w="sm" type="none"/>
+            <a:headEnd type="none" w="sm" len="sm"/>
+            <a:tailEnd type="none" w="sm" len="sm"/>
           </a:ln>
         </p:spPr>
       </p:sp>
       <p:sp>
         <p:nvSpPr>
           <p:cNvPr id="18" name="Google Shape;18;p3"/>
-          <p:cNvSpPr txBox="1"/>
+          <p:cNvSpPr txBox="1">
+            <a:spLocks noGrp="1"/>
+          </p:cNvSpPr>
           <p:nvPr>
             <p:ph type="title"/>
           </p:nvPr>
@@ -1989,7 +2052,7 @@
           </a:prstGeom>
         </p:spPr>
         <p:txBody>
-          <a:bodyPr anchorCtr="0" anchor="ctr" bIns="91425" lIns="91425" spcFirstLastPara="1" rIns="91425" wrap="square" tIns="91425">
+          <a:bodyPr spcFirstLastPara="1" wrap="square" lIns="91425" tIns="91425" rIns="91425" bIns="91425" anchor="ctr" anchorCtr="0">
             <a:noAutofit/>
           </a:bodyPr>
           <a:lstStyle>
@@ -2093,15 +2156,19 @@
               <a:defRPr/>
             </a:lvl9pPr>
           </a:lstStyle>
-          <a:p/>
+          <a:p>
+            <a:endParaRPr/>
+          </a:p>
         </p:txBody>
       </p:sp>
       <p:sp>
         <p:nvSpPr>
           <p:cNvPr id="19" name="Google Shape;19;p3"/>
-          <p:cNvSpPr txBox="1"/>
+          <p:cNvSpPr txBox="1">
+            <a:spLocks noGrp="1"/>
+          </p:cNvSpPr>
           <p:nvPr>
-            <p:ph idx="12" type="sldNum"/>
+            <p:ph type="sldNum" idx="12"/>
           </p:nvPr>
         </p:nvSpPr>
         <p:spPr>
@@ -2114,7 +2181,7 @@
           </a:prstGeom>
         </p:spPr>
         <p:txBody>
-          <a:bodyPr anchorCtr="0" anchor="ctr" bIns="91425" lIns="91425" spcFirstLastPara="1" rIns="91425" wrap="square" tIns="91425">
+          <a:bodyPr spcFirstLastPara="1" wrap="square" lIns="91425" tIns="91425" rIns="91425" bIns="91425" anchor="ctr" anchorCtr="0">
             <a:noAutofit/>
           </a:bodyPr>
           <a:lstStyle>
@@ -2156,7 +2223,7 @@
             </a:lvl9pPr>
           </a:lstStyle>
           <a:p>
-            <a:pPr indent="0" lvl="0" marL="0" rtl="0" algn="r">
+            <a:pPr marL="0" lvl="0" indent="0" algn="r" rtl="0">
               <a:spcBef>
                 <a:spcPts val="0"/>
               </a:spcBef>
@@ -2182,11 +2249,11 @@
 </file>
 
 <file path=ppt/slideLayouts/slideLayout3.xml><?xml version="1.0" encoding="utf-8"?>
-<p:sldLayout xmlns:a="http://schemas.openxmlformats.org/drawingml/2006/main" xmlns:r="http://schemas.openxmlformats.org/officeDocument/2006/relationships" xmlns:mc="http://schemas.openxmlformats.org/markup-compatibility/2006" xmlns:mv="urn:schemas-microsoft-com:mac:vml" xmlns:p="http://schemas.openxmlformats.org/presentationml/2006/main" xmlns:c="http://schemas.openxmlformats.org/drawingml/2006/chart" xmlns:dgm="http://schemas.openxmlformats.org/drawingml/2006/diagram" xmlns:o="urn:schemas-microsoft-com:office:office" xmlns:v="urn:schemas-microsoft-com:vml" xmlns:pvml="urn:schemas-microsoft-com:office:powerpoint" xmlns:com="http://schemas.openxmlformats.org/drawingml/2006/compatibility" xmlns:p14="http://schemas.microsoft.com/office/powerpoint/2010/main" xmlns:p15="http://schemas.microsoft.com/office/powerpoint/2012/main" xmlns:ahyp="http://schemas.microsoft.com/office/drawing/2018/hyperlinkcolor" matchingName="Title and body" type="tx">
+<p:sldLayout xmlns:a="http://schemas.openxmlformats.org/drawingml/2006/main" xmlns:r="http://schemas.openxmlformats.org/officeDocument/2006/relationships" xmlns:p="http://schemas.openxmlformats.org/presentationml/2006/main" matchingName="Title and body" type="tx">
   <p:cSld name="TITLE_AND_BODY">
     <p:spTree>
       <p:nvGrpSpPr>
-        <p:cNvPr id="20" name="Shape 20"/>
+        <p:cNvPr id="1" name="Shape 20"/>
         <p:cNvGrpSpPr/>
         <p:nvPr/>
       </p:nvGrpSpPr>
@@ -2220,12 +2287,12 @@
           </a:ln>
         </p:spPr>
         <p:txBody>
-          <a:bodyPr anchorCtr="0" anchor="ctr" bIns="91425" lIns="91425" spcFirstLastPara="1" rIns="91425" wrap="square" tIns="91425">
+          <a:bodyPr spcFirstLastPara="1" wrap="square" lIns="91425" tIns="91425" rIns="91425" bIns="91425" anchor="ctr" anchorCtr="0">
             <a:noAutofit/>
           </a:bodyPr>
           <a:lstStyle/>
           <a:p>
-            <a:pPr indent="0" lvl="0" marL="0" rtl="0" algn="l">
+            <a:pPr marL="0" lvl="0" indent="0" algn="l" rtl="0">
               <a:spcBef>
                 <a:spcPts val="0"/>
               </a:spcBef>
@@ -2234,9 +2301,6 @@
               </a:spcAft>
               <a:buNone/>
             </a:pPr>
-            <a:r>
-              <a:t/>
-            </a:r>
             <a:endParaRPr/>
           </a:p>
         </p:txBody>
@@ -2244,7 +2308,9 @@
       <p:sp>
         <p:nvSpPr>
           <p:cNvPr id="22" name="Google Shape;22;p4"/>
-          <p:cNvSpPr txBox="1"/>
+          <p:cNvSpPr txBox="1">
+            <a:spLocks noGrp="1"/>
+          </p:cNvSpPr>
           <p:nvPr>
             <p:ph type="title"/>
           </p:nvPr>
@@ -2259,7 +2325,7 @@
           </a:prstGeom>
         </p:spPr>
         <p:txBody>
-          <a:bodyPr anchorCtr="0" anchor="b" bIns="91425" lIns="91425" spcFirstLastPara="1" rIns="91425" wrap="square" tIns="91425">
+          <a:bodyPr spcFirstLastPara="1" wrap="square" lIns="91425" tIns="91425" rIns="91425" bIns="91425" anchor="b" anchorCtr="0">
             <a:noAutofit/>
           </a:bodyPr>
           <a:lstStyle>
@@ -2363,15 +2429,19 @@
               <a:defRPr/>
             </a:lvl9pPr>
           </a:lstStyle>
-          <a:p/>
+          <a:p>
+            <a:endParaRPr/>
+          </a:p>
         </p:txBody>
       </p:sp>
       <p:sp>
         <p:nvSpPr>
           <p:cNvPr id="23" name="Google Shape;23;p4"/>
-          <p:cNvSpPr txBox="1"/>
+          <p:cNvSpPr txBox="1">
+            <a:spLocks noGrp="1"/>
+          </p:cNvSpPr>
           <p:nvPr>
-            <p:ph idx="1" type="body"/>
+            <p:ph type="body" idx="1"/>
           </p:nvPr>
         </p:nvSpPr>
         <p:spPr>
@@ -2384,11 +2454,11 @@
           </a:prstGeom>
         </p:spPr>
         <p:txBody>
-          <a:bodyPr anchorCtr="0" anchor="t" bIns="91425" lIns="91425" spcFirstLastPara="1" rIns="91425" wrap="square" tIns="91425">
+          <a:bodyPr spcFirstLastPara="1" wrap="square" lIns="91425" tIns="91425" rIns="91425" bIns="91425" anchor="t" anchorCtr="0">
             <a:noAutofit/>
           </a:bodyPr>
           <a:lstStyle>
-            <a:lvl1pPr indent="-342900" lvl="0" marL="457200">
+            <a:lvl1pPr marL="457200" lvl="0" indent="-342900">
               <a:spcBef>
                 <a:spcPts val="0"/>
               </a:spcBef>
@@ -2399,7 +2469,7 @@
               <a:buChar char="●"/>
               <a:defRPr/>
             </a:lvl1pPr>
-            <a:lvl2pPr indent="-317500" lvl="1" marL="914400">
+            <a:lvl2pPr marL="914400" lvl="1" indent="-317500">
               <a:spcBef>
                 <a:spcPts val="1600"/>
               </a:spcBef>
@@ -2410,7 +2480,7 @@
               <a:buChar char="○"/>
               <a:defRPr/>
             </a:lvl2pPr>
-            <a:lvl3pPr indent="-317500" lvl="2" marL="1371600">
+            <a:lvl3pPr marL="1371600" lvl="2" indent="-317500">
               <a:spcBef>
                 <a:spcPts val="1600"/>
               </a:spcBef>
@@ -2421,7 +2491,7 @@
               <a:buChar char="■"/>
               <a:defRPr/>
             </a:lvl3pPr>
-            <a:lvl4pPr indent="-317500" lvl="3" marL="1828800">
+            <a:lvl4pPr marL="1828800" lvl="3" indent="-317500">
               <a:spcBef>
                 <a:spcPts val="1600"/>
               </a:spcBef>
@@ -2432,7 +2502,7 @@
               <a:buChar char="●"/>
               <a:defRPr/>
             </a:lvl4pPr>
-            <a:lvl5pPr indent="-317500" lvl="4" marL="2286000">
+            <a:lvl5pPr marL="2286000" lvl="4" indent="-317500">
               <a:spcBef>
                 <a:spcPts val="1600"/>
               </a:spcBef>
@@ -2443,7 +2513,7 @@
               <a:buChar char="○"/>
               <a:defRPr/>
             </a:lvl5pPr>
-            <a:lvl6pPr indent="-317500" lvl="5" marL="2743200">
+            <a:lvl6pPr marL="2743200" lvl="5" indent="-317500">
               <a:spcBef>
                 <a:spcPts val="1600"/>
               </a:spcBef>
@@ -2454,7 +2524,7 @@
               <a:buChar char="■"/>
               <a:defRPr/>
             </a:lvl6pPr>
-            <a:lvl7pPr indent="-317500" lvl="6" marL="3200400">
+            <a:lvl7pPr marL="3200400" lvl="6" indent="-317500">
               <a:spcBef>
                 <a:spcPts val="1600"/>
               </a:spcBef>
@@ -2465,7 +2535,7 @@
               <a:buChar char="●"/>
               <a:defRPr/>
             </a:lvl7pPr>
-            <a:lvl8pPr indent="-317500" lvl="7" marL="3657600">
+            <a:lvl8pPr marL="3657600" lvl="7" indent="-317500">
               <a:spcBef>
                 <a:spcPts val="1600"/>
               </a:spcBef>
@@ -2476,7 +2546,7 @@
               <a:buChar char="○"/>
               <a:defRPr/>
             </a:lvl8pPr>
-            <a:lvl9pPr indent="-317500" lvl="8" marL="4114800">
+            <a:lvl9pPr marL="4114800" lvl="8" indent="-317500">
               <a:spcBef>
                 <a:spcPts val="1600"/>
               </a:spcBef>
@@ -2488,15 +2558,19 @@
               <a:defRPr/>
             </a:lvl9pPr>
           </a:lstStyle>
-          <a:p/>
+          <a:p>
+            <a:endParaRPr/>
+          </a:p>
         </p:txBody>
       </p:sp>
       <p:sp>
         <p:nvSpPr>
           <p:cNvPr id="24" name="Google Shape;24;p4"/>
-          <p:cNvSpPr txBox="1"/>
+          <p:cNvSpPr txBox="1">
+            <a:spLocks noGrp="1"/>
+          </p:cNvSpPr>
           <p:nvPr>
-            <p:ph idx="12" type="sldNum"/>
+            <p:ph type="sldNum" idx="12"/>
           </p:nvPr>
         </p:nvSpPr>
         <p:spPr>
@@ -2509,7 +2583,7 @@
           </a:prstGeom>
         </p:spPr>
         <p:txBody>
-          <a:bodyPr anchorCtr="0" anchor="ctr" bIns="91425" lIns="91425" spcFirstLastPara="1" rIns="91425" wrap="square" tIns="91425">
+          <a:bodyPr spcFirstLastPara="1" wrap="square" lIns="91425" tIns="91425" rIns="91425" bIns="91425" anchor="ctr" anchorCtr="0">
             <a:noAutofit/>
           </a:bodyPr>
           <a:lstStyle>
@@ -2551,7 +2625,7 @@
             </a:lvl9pPr>
           </a:lstStyle>
           <a:p>
-            <a:pPr indent="0" lvl="0" marL="0" rtl="0" algn="r">
+            <a:pPr marL="0" lvl="0" indent="0" algn="r" rtl="0">
               <a:spcBef>
                 <a:spcPts val="0"/>
               </a:spcBef>
@@ -2577,11 +2651,11 @@
 </file>
 
 <file path=ppt/slideLayouts/slideLayout4.xml><?xml version="1.0" encoding="utf-8"?>
-<p:sldLayout xmlns:a="http://schemas.openxmlformats.org/drawingml/2006/main" xmlns:r="http://schemas.openxmlformats.org/officeDocument/2006/relationships" xmlns:mc="http://schemas.openxmlformats.org/markup-compatibility/2006" xmlns:mv="urn:schemas-microsoft-com:mac:vml" xmlns:p="http://schemas.openxmlformats.org/presentationml/2006/main" xmlns:c="http://schemas.openxmlformats.org/drawingml/2006/chart" xmlns:dgm="http://schemas.openxmlformats.org/drawingml/2006/diagram" xmlns:o="urn:schemas-microsoft-com:office:office" xmlns:v="urn:schemas-microsoft-com:vml" xmlns:pvml="urn:schemas-microsoft-com:office:powerpoint" xmlns:com="http://schemas.openxmlformats.org/drawingml/2006/compatibility" xmlns:p14="http://schemas.microsoft.com/office/powerpoint/2010/main" xmlns:p15="http://schemas.microsoft.com/office/powerpoint/2012/main" xmlns:ahyp="http://schemas.microsoft.com/office/drawing/2018/hyperlinkcolor" matchingName="Title and two columns" type="twoColTx">
+<p:sldLayout xmlns:a="http://schemas.openxmlformats.org/drawingml/2006/main" xmlns:r="http://schemas.openxmlformats.org/officeDocument/2006/relationships" xmlns:p="http://schemas.openxmlformats.org/presentationml/2006/main" matchingName="Title and two columns" type="twoColTx">
   <p:cSld name="TITLE_AND_TWO_COLUMNS">
     <p:spTree>
       <p:nvGrpSpPr>
-        <p:cNvPr id="25" name="Shape 25"/>
+        <p:cNvPr id="1" name="Shape 25"/>
         <p:cNvGrpSpPr/>
         <p:nvPr/>
       </p:nvGrpSpPr>
@@ -2596,7 +2670,9 @@
       <p:sp>
         <p:nvSpPr>
           <p:cNvPr id="26" name="Google Shape;26;p5"/>
-          <p:cNvSpPr txBox="1"/>
+          <p:cNvSpPr txBox="1">
+            <a:spLocks noGrp="1"/>
+          </p:cNvSpPr>
           <p:nvPr>
             <p:ph type="title"/>
           </p:nvPr>
@@ -2611,7 +2687,7 @@
           </a:prstGeom>
         </p:spPr>
         <p:txBody>
-          <a:bodyPr anchorCtr="0" anchor="b" bIns="91425" lIns="91425" spcFirstLastPara="1" rIns="91425" wrap="square" tIns="91425">
+          <a:bodyPr spcFirstLastPara="1" wrap="square" lIns="91425" tIns="91425" rIns="91425" bIns="91425" anchor="b" anchorCtr="0">
             <a:noAutofit/>
           </a:bodyPr>
           <a:lstStyle>
@@ -2715,15 +2791,19 @@
               <a:defRPr/>
             </a:lvl9pPr>
           </a:lstStyle>
-          <a:p/>
+          <a:p>
+            <a:endParaRPr/>
+          </a:p>
         </p:txBody>
       </p:sp>
       <p:sp>
         <p:nvSpPr>
           <p:cNvPr id="27" name="Google Shape;27;p5"/>
-          <p:cNvSpPr txBox="1"/>
+          <p:cNvSpPr txBox="1">
+            <a:spLocks noGrp="1"/>
+          </p:cNvSpPr>
           <p:nvPr>
-            <p:ph idx="1" type="body"/>
+            <p:ph type="body" idx="1"/>
           </p:nvPr>
         </p:nvSpPr>
         <p:spPr>
@@ -2736,11 +2816,11 @@
           </a:prstGeom>
         </p:spPr>
         <p:txBody>
-          <a:bodyPr anchorCtr="0" anchor="t" bIns="91425" lIns="91425" spcFirstLastPara="1" rIns="91425" wrap="square" tIns="91425">
+          <a:bodyPr spcFirstLastPara="1" wrap="square" lIns="91425" tIns="91425" rIns="91425" bIns="91425" anchor="t" anchorCtr="0">
             <a:noAutofit/>
           </a:bodyPr>
           <a:lstStyle>
-            <a:lvl1pPr indent="-317500" lvl="0" marL="457200">
+            <a:lvl1pPr marL="457200" lvl="0" indent="-317500">
               <a:spcBef>
                 <a:spcPts val="0"/>
               </a:spcBef>
@@ -2751,7 +2831,7 @@
               <a:buChar char="●"/>
               <a:defRPr sz="1400"/>
             </a:lvl1pPr>
-            <a:lvl2pPr indent="-304800" lvl="1" marL="914400">
+            <a:lvl2pPr marL="914400" lvl="1" indent="-304800">
               <a:spcBef>
                 <a:spcPts val="1600"/>
               </a:spcBef>
@@ -2762,7 +2842,7 @@
               <a:buChar char="○"/>
               <a:defRPr sz="1200"/>
             </a:lvl2pPr>
-            <a:lvl3pPr indent="-304800" lvl="2" marL="1371600">
+            <a:lvl3pPr marL="1371600" lvl="2" indent="-304800">
               <a:spcBef>
                 <a:spcPts val="1600"/>
               </a:spcBef>
@@ -2773,7 +2853,7 @@
               <a:buChar char="■"/>
               <a:defRPr sz="1200"/>
             </a:lvl3pPr>
-            <a:lvl4pPr indent="-304800" lvl="3" marL="1828800">
+            <a:lvl4pPr marL="1828800" lvl="3" indent="-304800">
               <a:spcBef>
                 <a:spcPts val="1600"/>
               </a:spcBef>
@@ -2784,7 +2864,7 @@
               <a:buChar char="●"/>
               <a:defRPr sz="1200"/>
             </a:lvl4pPr>
-            <a:lvl5pPr indent="-304800" lvl="4" marL="2286000">
+            <a:lvl5pPr marL="2286000" lvl="4" indent="-304800">
               <a:spcBef>
                 <a:spcPts val="1600"/>
               </a:spcBef>
@@ -2795,7 +2875,7 @@
               <a:buChar char="○"/>
               <a:defRPr sz="1200"/>
             </a:lvl5pPr>
-            <a:lvl6pPr indent="-304800" lvl="5" marL="2743200">
+            <a:lvl6pPr marL="2743200" lvl="5" indent="-304800">
               <a:spcBef>
                 <a:spcPts val="1600"/>
               </a:spcBef>
@@ -2806,7 +2886,7 @@
               <a:buChar char="■"/>
               <a:defRPr sz="1200"/>
             </a:lvl6pPr>
-            <a:lvl7pPr indent="-304800" lvl="6" marL="3200400">
+            <a:lvl7pPr marL="3200400" lvl="6" indent="-304800">
               <a:spcBef>
                 <a:spcPts val="1600"/>
               </a:spcBef>
@@ -2817,7 +2897,7 @@
               <a:buChar char="●"/>
               <a:defRPr sz="1200"/>
             </a:lvl7pPr>
-            <a:lvl8pPr indent="-304800" lvl="7" marL="3657600">
+            <a:lvl8pPr marL="3657600" lvl="7" indent="-304800">
               <a:spcBef>
                 <a:spcPts val="1600"/>
               </a:spcBef>
@@ -2828,7 +2908,7 @@
               <a:buChar char="○"/>
               <a:defRPr sz="1200"/>
             </a:lvl8pPr>
-            <a:lvl9pPr indent="-304800" lvl="8" marL="4114800">
+            <a:lvl9pPr marL="4114800" lvl="8" indent="-304800">
               <a:spcBef>
                 <a:spcPts val="1600"/>
               </a:spcBef>
@@ -2840,15 +2920,19 @@
               <a:defRPr sz="1200"/>
             </a:lvl9pPr>
           </a:lstStyle>
-          <a:p/>
+          <a:p>
+            <a:endParaRPr/>
+          </a:p>
         </p:txBody>
       </p:sp>
       <p:sp>
         <p:nvSpPr>
           <p:cNvPr id="28" name="Google Shape;28;p5"/>
-          <p:cNvSpPr txBox="1"/>
+          <p:cNvSpPr txBox="1">
+            <a:spLocks noGrp="1"/>
+          </p:cNvSpPr>
           <p:nvPr>
-            <p:ph idx="2" type="body"/>
+            <p:ph type="body" idx="2"/>
           </p:nvPr>
         </p:nvSpPr>
         <p:spPr>
@@ -2861,11 +2945,11 @@
           </a:prstGeom>
         </p:spPr>
         <p:txBody>
-          <a:bodyPr anchorCtr="0" anchor="t" bIns="91425" lIns="91425" spcFirstLastPara="1" rIns="91425" wrap="square" tIns="91425">
+          <a:bodyPr spcFirstLastPara="1" wrap="square" lIns="91425" tIns="91425" rIns="91425" bIns="91425" anchor="t" anchorCtr="0">
             <a:noAutofit/>
           </a:bodyPr>
           <a:lstStyle>
-            <a:lvl1pPr indent="-317500" lvl="0" marL="457200">
+            <a:lvl1pPr marL="457200" lvl="0" indent="-317500">
               <a:spcBef>
                 <a:spcPts val="0"/>
               </a:spcBef>
@@ -2876,7 +2960,7 @@
               <a:buChar char="●"/>
               <a:defRPr sz="1400"/>
             </a:lvl1pPr>
-            <a:lvl2pPr indent="-304800" lvl="1" marL="914400">
+            <a:lvl2pPr marL="914400" lvl="1" indent="-304800">
               <a:spcBef>
                 <a:spcPts val="1600"/>
               </a:spcBef>
@@ -2887,7 +2971,7 @@
               <a:buChar char="○"/>
               <a:defRPr sz="1200"/>
             </a:lvl2pPr>
-            <a:lvl3pPr indent="-304800" lvl="2" marL="1371600">
+            <a:lvl3pPr marL="1371600" lvl="2" indent="-304800">
               <a:spcBef>
                 <a:spcPts val="1600"/>
               </a:spcBef>
@@ -2898,7 +2982,7 @@
               <a:buChar char="■"/>
               <a:defRPr sz="1200"/>
             </a:lvl3pPr>
-            <a:lvl4pPr indent="-304800" lvl="3" marL="1828800">
+            <a:lvl4pPr marL="1828800" lvl="3" indent="-304800">
               <a:spcBef>
                 <a:spcPts val="1600"/>
               </a:spcBef>
@@ -2909,7 +2993,7 @@
               <a:buChar char="●"/>
               <a:defRPr sz="1200"/>
             </a:lvl4pPr>
-            <a:lvl5pPr indent="-304800" lvl="4" marL="2286000">
+            <a:lvl5pPr marL="2286000" lvl="4" indent="-304800">
               <a:spcBef>
                 <a:spcPts val="1600"/>
               </a:spcBef>
@@ -2920,7 +3004,7 @@
               <a:buChar char="○"/>
               <a:defRPr sz="1200"/>
             </a:lvl5pPr>
-            <a:lvl6pPr indent="-304800" lvl="5" marL="2743200">
+            <a:lvl6pPr marL="2743200" lvl="5" indent="-304800">
               <a:spcBef>
                 <a:spcPts val="1600"/>
               </a:spcBef>
@@ -2931,7 +3015,7 @@
               <a:buChar char="■"/>
               <a:defRPr sz="1200"/>
             </a:lvl6pPr>
-            <a:lvl7pPr indent="-304800" lvl="6" marL="3200400">
+            <a:lvl7pPr marL="3200400" lvl="6" indent="-304800">
               <a:spcBef>
                 <a:spcPts val="1600"/>
               </a:spcBef>
@@ -2942,7 +3026,7 @@
               <a:buChar char="●"/>
               <a:defRPr sz="1200"/>
             </a:lvl7pPr>
-            <a:lvl8pPr indent="-304800" lvl="7" marL="3657600">
+            <a:lvl8pPr marL="3657600" lvl="7" indent="-304800">
               <a:spcBef>
                 <a:spcPts val="1600"/>
               </a:spcBef>
@@ -2953,7 +3037,7 @@
               <a:buChar char="○"/>
               <a:defRPr sz="1200"/>
             </a:lvl8pPr>
-            <a:lvl9pPr indent="-304800" lvl="8" marL="4114800">
+            <a:lvl9pPr marL="4114800" lvl="8" indent="-304800">
               <a:spcBef>
                 <a:spcPts val="1600"/>
               </a:spcBef>
@@ -2965,15 +3049,19 @@
               <a:defRPr sz="1200"/>
             </a:lvl9pPr>
           </a:lstStyle>
-          <a:p/>
+          <a:p>
+            <a:endParaRPr/>
+          </a:p>
         </p:txBody>
       </p:sp>
       <p:sp>
         <p:nvSpPr>
           <p:cNvPr id="29" name="Google Shape;29;p5"/>
-          <p:cNvSpPr txBox="1"/>
+          <p:cNvSpPr txBox="1">
+            <a:spLocks noGrp="1"/>
+          </p:cNvSpPr>
           <p:nvPr>
-            <p:ph idx="12" type="sldNum"/>
+            <p:ph type="sldNum" idx="12"/>
           </p:nvPr>
         </p:nvSpPr>
         <p:spPr>
@@ -2986,7 +3074,7 @@
           </a:prstGeom>
         </p:spPr>
         <p:txBody>
-          <a:bodyPr anchorCtr="0" anchor="ctr" bIns="91425" lIns="91425" spcFirstLastPara="1" rIns="91425" wrap="square" tIns="91425">
+          <a:bodyPr spcFirstLastPara="1" wrap="square" lIns="91425" tIns="91425" rIns="91425" bIns="91425" anchor="ctr" anchorCtr="0">
             <a:noAutofit/>
           </a:bodyPr>
           <a:lstStyle>
@@ -3028,7 +3116,7 @@
             </a:lvl9pPr>
           </a:lstStyle>
           <a:p>
-            <a:pPr indent="0" lvl="0" marL="0" rtl="0" algn="r">
+            <a:pPr marL="0" lvl="0" indent="0" algn="r" rtl="0">
               <a:spcBef>
                 <a:spcPts val="0"/>
               </a:spcBef>
@@ -3054,11 +3142,11 @@
 </file>
 
 <file path=ppt/slideLayouts/slideLayout5.xml><?xml version="1.0" encoding="utf-8"?>
-<p:sldLayout xmlns:a="http://schemas.openxmlformats.org/drawingml/2006/main" xmlns:r="http://schemas.openxmlformats.org/officeDocument/2006/relationships" xmlns:mc="http://schemas.openxmlformats.org/markup-compatibility/2006" xmlns:mv="urn:schemas-microsoft-com:mac:vml" xmlns:p="http://schemas.openxmlformats.org/presentationml/2006/main" xmlns:c="http://schemas.openxmlformats.org/drawingml/2006/chart" xmlns:dgm="http://schemas.openxmlformats.org/drawingml/2006/diagram" xmlns:o="urn:schemas-microsoft-com:office:office" xmlns:v="urn:schemas-microsoft-com:vml" xmlns:pvml="urn:schemas-microsoft-com:office:powerpoint" xmlns:com="http://schemas.openxmlformats.org/drawingml/2006/compatibility" xmlns:p14="http://schemas.microsoft.com/office/powerpoint/2010/main" xmlns:p15="http://schemas.microsoft.com/office/powerpoint/2012/main" xmlns:ahyp="http://schemas.microsoft.com/office/drawing/2018/hyperlinkcolor" matchingName="Title only" type="titleOnly">
+<p:sldLayout xmlns:a="http://schemas.openxmlformats.org/drawingml/2006/main" xmlns:r="http://schemas.openxmlformats.org/officeDocument/2006/relationships" xmlns:p="http://schemas.openxmlformats.org/presentationml/2006/main" matchingName="Title only" type="titleOnly">
   <p:cSld name="TITLE_ONLY">
     <p:spTree>
       <p:nvGrpSpPr>
-        <p:cNvPr id="30" name="Shape 30"/>
+        <p:cNvPr id="1" name="Shape 30"/>
         <p:cNvGrpSpPr/>
         <p:nvPr/>
       </p:nvGrpSpPr>
@@ -3073,7 +3161,9 @@
       <p:sp>
         <p:nvSpPr>
           <p:cNvPr id="31" name="Google Shape;31;p6"/>
-          <p:cNvSpPr txBox="1"/>
+          <p:cNvSpPr txBox="1">
+            <a:spLocks noGrp="1"/>
+          </p:cNvSpPr>
           <p:nvPr>
             <p:ph type="title"/>
           </p:nvPr>
@@ -3088,7 +3178,7 @@
           </a:prstGeom>
         </p:spPr>
         <p:txBody>
-          <a:bodyPr anchorCtr="0" anchor="b" bIns="91425" lIns="91425" spcFirstLastPara="1" rIns="91425" wrap="square" tIns="91425">
+          <a:bodyPr spcFirstLastPara="1" wrap="square" lIns="91425" tIns="91425" rIns="91425" bIns="91425" anchor="b" anchorCtr="0">
             <a:noAutofit/>
           </a:bodyPr>
           <a:lstStyle>
@@ -3192,15 +3282,19 @@
               <a:defRPr/>
             </a:lvl9pPr>
           </a:lstStyle>
-          <a:p/>
+          <a:p>
+            <a:endParaRPr/>
+          </a:p>
         </p:txBody>
       </p:sp>
       <p:sp>
         <p:nvSpPr>
           <p:cNvPr id="32" name="Google Shape;32;p6"/>
-          <p:cNvSpPr txBox="1"/>
+          <p:cNvSpPr txBox="1">
+            <a:spLocks noGrp="1"/>
+          </p:cNvSpPr>
           <p:nvPr>
-            <p:ph idx="12" type="sldNum"/>
+            <p:ph type="sldNum" idx="12"/>
           </p:nvPr>
         </p:nvSpPr>
         <p:spPr>
@@ -3213,7 +3307,7 @@
           </a:prstGeom>
         </p:spPr>
         <p:txBody>
-          <a:bodyPr anchorCtr="0" anchor="ctr" bIns="91425" lIns="91425" spcFirstLastPara="1" rIns="91425" wrap="square" tIns="91425">
+          <a:bodyPr spcFirstLastPara="1" wrap="square" lIns="91425" tIns="91425" rIns="91425" bIns="91425" anchor="ctr" anchorCtr="0">
             <a:noAutofit/>
           </a:bodyPr>
           <a:lstStyle>
@@ -3255,7 +3349,7 @@
             </a:lvl9pPr>
           </a:lstStyle>
           <a:p>
-            <a:pPr indent="0" lvl="0" marL="0" rtl="0" algn="r">
+            <a:pPr marL="0" lvl="0" indent="0" algn="r" rtl="0">
               <a:spcBef>
                 <a:spcPts val="0"/>
               </a:spcBef>
@@ -3281,11 +3375,11 @@
 </file>
 
 <file path=ppt/slideLayouts/slideLayout6.xml><?xml version="1.0" encoding="utf-8"?>
-<p:sldLayout xmlns:a="http://schemas.openxmlformats.org/drawingml/2006/main" xmlns:r="http://schemas.openxmlformats.org/officeDocument/2006/relationships" xmlns:mc="http://schemas.openxmlformats.org/markup-compatibility/2006" xmlns:mv="urn:schemas-microsoft-com:mac:vml" xmlns:p="http://schemas.openxmlformats.org/presentationml/2006/main" xmlns:c="http://schemas.openxmlformats.org/drawingml/2006/chart" xmlns:dgm="http://schemas.openxmlformats.org/drawingml/2006/diagram" xmlns:o="urn:schemas-microsoft-com:office:office" xmlns:v="urn:schemas-microsoft-com:vml" xmlns:pvml="urn:schemas-microsoft-com:office:powerpoint" xmlns:com="http://schemas.openxmlformats.org/drawingml/2006/compatibility" xmlns:p14="http://schemas.microsoft.com/office/powerpoint/2010/main" xmlns:p15="http://schemas.microsoft.com/office/powerpoint/2012/main" xmlns:ahyp="http://schemas.microsoft.com/office/drawing/2018/hyperlinkcolor" matchingName="One column text">
+<p:sldLayout xmlns:a="http://schemas.openxmlformats.org/drawingml/2006/main" xmlns:r="http://schemas.openxmlformats.org/officeDocument/2006/relationships" xmlns:p="http://schemas.openxmlformats.org/presentationml/2006/main" matchingName="One column text">
   <p:cSld name="ONE_COLUMN_TEXT">
     <p:spTree>
       <p:nvGrpSpPr>
-        <p:cNvPr id="33" name="Shape 33"/>
+        <p:cNvPr id="1" name="Shape 33"/>
         <p:cNvGrpSpPr/>
         <p:nvPr/>
       </p:nvGrpSpPr>
@@ -3300,7 +3394,9 @@
       <p:sp>
         <p:nvSpPr>
           <p:cNvPr id="34" name="Google Shape;34;p7"/>
-          <p:cNvSpPr txBox="1"/>
+          <p:cNvSpPr txBox="1">
+            <a:spLocks noGrp="1"/>
+          </p:cNvSpPr>
           <p:nvPr>
             <p:ph type="title"/>
           </p:nvPr>
@@ -3315,7 +3411,7 @@
           </a:prstGeom>
         </p:spPr>
         <p:txBody>
-          <a:bodyPr anchorCtr="0" anchor="b" bIns="91425" lIns="91425" spcFirstLastPara="1" rIns="91425" wrap="square" tIns="91425">
+          <a:bodyPr spcFirstLastPara="1" wrap="square" lIns="91425" tIns="91425" rIns="91425" bIns="91425" anchor="b" anchorCtr="0">
             <a:noAutofit/>
           </a:bodyPr>
           <a:lstStyle>
@@ -3419,15 +3515,19 @@
               <a:defRPr sz="3000"/>
             </a:lvl9pPr>
           </a:lstStyle>
-          <a:p/>
+          <a:p>
+            <a:endParaRPr/>
+          </a:p>
         </p:txBody>
       </p:sp>
       <p:sp>
         <p:nvSpPr>
           <p:cNvPr id="35" name="Google Shape;35;p7"/>
-          <p:cNvSpPr txBox="1"/>
+          <p:cNvSpPr txBox="1">
+            <a:spLocks noGrp="1"/>
+          </p:cNvSpPr>
           <p:nvPr>
-            <p:ph idx="1" type="body"/>
+            <p:ph type="body" idx="1"/>
           </p:nvPr>
         </p:nvSpPr>
         <p:spPr>
@@ -3440,11 +3540,11 @@
           </a:prstGeom>
         </p:spPr>
         <p:txBody>
-          <a:bodyPr anchorCtr="0" anchor="t" bIns="91425" lIns="91425" spcFirstLastPara="1" rIns="91425" wrap="square" tIns="91425">
+          <a:bodyPr spcFirstLastPara="1" wrap="square" lIns="91425" tIns="91425" rIns="91425" bIns="91425" anchor="t" anchorCtr="0">
             <a:noAutofit/>
           </a:bodyPr>
           <a:lstStyle>
-            <a:lvl1pPr indent="-304800" lvl="0" marL="457200">
+            <a:lvl1pPr marL="457200" lvl="0" indent="-304800">
               <a:spcBef>
                 <a:spcPts val="0"/>
               </a:spcBef>
@@ -3455,7 +3555,7 @@
               <a:buChar char="●"/>
               <a:defRPr sz="1200"/>
             </a:lvl1pPr>
-            <a:lvl2pPr indent="-304800" lvl="1" marL="914400">
+            <a:lvl2pPr marL="914400" lvl="1" indent="-304800">
               <a:spcBef>
                 <a:spcPts val="1600"/>
               </a:spcBef>
@@ -3466,7 +3566,7 @@
               <a:buChar char="○"/>
               <a:defRPr sz="1200"/>
             </a:lvl2pPr>
-            <a:lvl3pPr indent="-304800" lvl="2" marL="1371600">
+            <a:lvl3pPr marL="1371600" lvl="2" indent="-304800">
               <a:spcBef>
                 <a:spcPts val="1600"/>
               </a:spcBef>
@@ -3477,7 +3577,7 @@
               <a:buChar char="■"/>
               <a:defRPr sz="1200"/>
             </a:lvl3pPr>
-            <a:lvl4pPr indent="-304800" lvl="3" marL="1828800">
+            <a:lvl4pPr marL="1828800" lvl="3" indent="-304800">
               <a:spcBef>
                 <a:spcPts val="1600"/>
               </a:spcBef>
@@ -3488,7 +3588,7 @@
               <a:buChar char="●"/>
               <a:defRPr sz="1200"/>
             </a:lvl4pPr>
-            <a:lvl5pPr indent="-304800" lvl="4" marL="2286000">
+            <a:lvl5pPr marL="2286000" lvl="4" indent="-304800">
               <a:spcBef>
                 <a:spcPts val="1600"/>
               </a:spcBef>
@@ -3499,7 +3599,7 @@
               <a:buChar char="○"/>
               <a:defRPr sz="1200"/>
             </a:lvl5pPr>
-            <a:lvl6pPr indent="-304800" lvl="5" marL="2743200">
+            <a:lvl6pPr marL="2743200" lvl="5" indent="-304800">
               <a:spcBef>
                 <a:spcPts val="1600"/>
               </a:spcBef>
@@ -3510,7 +3610,7 @@
               <a:buChar char="■"/>
               <a:defRPr sz="1200"/>
             </a:lvl6pPr>
-            <a:lvl7pPr indent="-304800" lvl="6" marL="3200400">
+            <a:lvl7pPr marL="3200400" lvl="6" indent="-304800">
               <a:spcBef>
                 <a:spcPts val="1600"/>
               </a:spcBef>
@@ -3521,7 +3621,7 @@
               <a:buChar char="●"/>
               <a:defRPr sz="1200"/>
             </a:lvl7pPr>
-            <a:lvl8pPr indent="-304800" lvl="7" marL="3657600">
+            <a:lvl8pPr marL="3657600" lvl="7" indent="-304800">
               <a:spcBef>
                 <a:spcPts val="1600"/>
               </a:spcBef>
@@ -3532,7 +3632,7 @@
               <a:buChar char="○"/>
               <a:defRPr sz="1200"/>
             </a:lvl8pPr>
-            <a:lvl9pPr indent="-304800" lvl="8" marL="4114800">
+            <a:lvl9pPr marL="4114800" lvl="8" indent="-304800">
               <a:spcBef>
                 <a:spcPts val="1600"/>
               </a:spcBef>
@@ -3544,15 +3644,19 @@
               <a:defRPr sz="1200"/>
             </a:lvl9pPr>
           </a:lstStyle>
-          <a:p/>
+          <a:p>
+            <a:endParaRPr/>
+          </a:p>
         </p:txBody>
       </p:sp>
       <p:sp>
         <p:nvSpPr>
           <p:cNvPr id="36" name="Google Shape;36;p7"/>
-          <p:cNvSpPr txBox="1"/>
+          <p:cNvSpPr txBox="1">
+            <a:spLocks noGrp="1"/>
+          </p:cNvSpPr>
           <p:nvPr>
-            <p:ph idx="12" type="sldNum"/>
+            <p:ph type="sldNum" idx="12"/>
           </p:nvPr>
         </p:nvSpPr>
         <p:spPr>
@@ -3565,7 +3669,7 @@
           </a:prstGeom>
         </p:spPr>
         <p:txBody>
-          <a:bodyPr anchorCtr="0" anchor="ctr" bIns="91425" lIns="91425" spcFirstLastPara="1" rIns="91425" wrap="square" tIns="91425">
+          <a:bodyPr spcFirstLastPara="1" wrap="square" lIns="91425" tIns="91425" rIns="91425" bIns="91425" anchor="ctr" anchorCtr="0">
             <a:noAutofit/>
           </a:bodyPr>
           <a:lstStyle>
@@ -3607,7 +3711,7 @@
             </a:lvl9pPr>
           </a:lstStyle>
           <a:p>
-            <a:pPr indent="0" lvl="0" marL="0" rtl="0" algn="r">
+            <a:pPr marL="0" lvl="0" indent="0" algn="r" rtl="0">
               <a:spcBef>
                 <a:spcPts val="0"/>
               </a:spcBef>
@@ -3633,11 +3737,11 @@
 </file>
 
 <file path=ppt/slideLayouts/slideLayout7.xml><?xml version="1.0" encoding="utf-8"?>
-<p:sldLayout xmlns:a="http://schemas.openxmlformats.org/drawingml/2006/main" xmlns:r="http://schemas.openxmlformats.org/officeDocument/2006/relationships" xmlns:mc="http://schemas.openxmlformats.org/markup-compatibility/2006" xmlns:mv="urn:schemas-microsoft-com:mac:vml" xmlns:p="http://schemas.openxmlformats.org/presentationml/2006/main" xmlns:c="http://schemas.openxmlformats.org/drawingml/2006/chart" xmlns:dgm="http://schemas.openxmlformats.org/drawingml/2006/diagram" xmlns:o="urn:schemas-microsoft-com:office:office" xmlns:v="urn:schemas-microsoft-com:vml" xmlns:pvml="urn:schemas-microsoft-com:office:powerpoint" xmlns:com="http://schemas.openxmlformats.org/drawingml/2006/compatibility" xmlns:p14="http://schemas.microsoft.com/office/powerpoint/2010/main" xmlns:p15="http://schemas.microsoft.com/office/powerpoint/2012/main" xmlns:ahyp="http://schemas.microsoft.com/office/drawing/2018/hyperlinkcolor" matchingName="Main point">
+<p:sldLayout xmlns:a="http://schemas.openxmlformats.org/drawingml/2006/main" xmlns:r="http://schemas.openxmlformats.org/officeDocument/2006/relationships" xmlns:p="http://schemas.openxmlformats.org/presentationml/2006/main" matchingName="Main point">
   <p:cSld name="MAIN_POINT">
     <p:spTree>
       <p:nvGrpSpPr>
-        <p:cNvPr id="37" name="Shape 37"/>
+        <p:cNvPr id="1" name="Shape 37"/>
         <p:cNvGrpSpPr/>
         <p:nvPr/>
       </p:nvGrpSpPr>
@@ -3671,12 +3775,12 @@
           </a:ln>
         </p:spPr>
         <p:txBody>
-          <a:bodyPr anchorCtr="0" anchor="ctr" bIns="91425" lIns="91425" spcFirstLastPara="1" rIns="91425" wrap="square" tIns="91425">
+          <a:bodyPr spcFirstLastPara="1" wrap="square" lIns="91425" tIns="91425" rIns="91425" bIns="91425" anchor="ctr" anchorCtr="0">
             <a:noAutofit/>
           </a:bodyPr>
           <a:lstStyle/>
           <a:p>
-            <a:pPr indent="0" lvl="0" marL="0" rtl="0" algn="l">
+            <a:pPr marL="0" lvl="0" indent="0" algn="l" rtl="0">
               <a:spcBef>
                 <a:spcPts val="0"/>
               </a:spcBef>
@@ -3685,9 +3789,6 @@
               </a:spcAft>
               <a:buNone/>
             </a:pPr>
-            <a:r>
-              <a:t/>
-            </a:r>
             <a:endParaRPr/>
           </a:p>
         </p:txBody>
@@ -3695,7 +3796,9 @@
       <p:sp>
         <p:nvSpPr>
           <p:cNvPr id="39" name="Google Shape;39;p8"/>
-          <p:cNvSpPr txBox="1"/>
+          <p:cNvSpPr txBox="1">
+            <a:spLocks noGrp="1"/>
+          </p:cNvSpPr>
           <p:nvPr>
             <p:ph type="title"/>
           </p:nvPr>
@@ -3710,7 +3813,7 @@
           </a:prstGeom>
         </p:spPr>
         <p:txBody>
-          <a:bodyPr anchorCtr="0" anchor="ctr" bIns="91425" lIns="91425" spcFirstLastPara="1" rIns="91425" wrap="square" tIns="91425">
+          <a:bodyPr spcFirstLastPara="1" wrap="square" lIns="91425" tIns="91425" rIns="91425" bIns="91425" anchor="ctr" anchorCtr="0">
             <a:noAutofit/>
           </a:bodyPr>
           <a:lstStyle>
@@ -3814,15 +3917,19 @@
               <a:defRPr sz="4800"/>
             </a:lvl9pPr>
           </a:lstStyle>
-          <a:p/>
+          <a:p>
+            <a:endParaRPr/>
+          </a:p>
         </p:txBody>
       </p:sp>
       <p:sp>
         <p:nvSpPr>
           <p:cNvPr id="40" name="Google Shape;40;p8"/>
-          <p:cNvSpPr txBox="1"/>
+          <p:cNvSpPr txBox="1">
+            <a:spLocks noGrp="1"/>
+          </p:cNvSpPr>
           <p:nvPr>
-            <p:ph idx="12" type="sldNum"/>
+            <p:ph type="sldNum" idx="12"/>
           </p:nvPr>
         </p:nvSpPr>
         <p:spPr>
@@ -3835,7 +3942,7 @@
           </a:prstGeom>
         </p:spPr>
         <p:txBody>
-          <a:bodyPr anchorCtr="0" anchor="ctr" bIns="91425" lIns="91425" spcFirstLastPara="1" rIns="91425" wrap="square" tIns="91425">
+          <a:bodyPr spcFirstLastPara="1" wrap="square" lIns="91425" tIns="91425" rIns="91425" bIns="91425" anchor="ctr" anchorCtr="0">
             <a:noAutofit/>
           </a:bodyPr>
           <a:lstStyle>
@@ -3877,7 +3984,7 @@
             </a:lvl9pPr>
           </a:lstStyle>
           <a:p>
-            <a:pPr indent="0" lvl="0" marL="0" rtl="0" algn="r">
+            <a:pPr marL="0" lvl="0" indent="0" algn="r" rtl="0">
               <a:spcBef>
                 <a:spcPts val="0"/>
               </a:spcBef>
@@ -3903,11 +4010,11 @@
 </file>
 
 <file path=ppt/slideLayouts/slideLayout8.xml><?xml version="1.0" encoding="utf-8"?>
-<p:sldLayout xmlns:a="http://schemas.openxmlformats.org/drawingml/2006/main" xmlns:r="http://schemas.openxmlformats.org/officeDocument/2006/relationships" xmlns:mc="http://schemas.openxmlformats.org/markup-compatibility/2006" xmlns:mv="urn:schemas-microsoft-com:mac:vml" xmlns:p="http://schemas.openxmlformats.org/presentationml/2006/main" xmlns:c="http://schemas.openxmlformats.org/drawingml/2006/chart" xmlns:dgm="http://schemas.openxmlformats.org/drawingml/2006/diagram" xmlns:o="urn:schemas-microsoft-com:office:office" xmlns:v="urn:schemas-microsoft-com:vml" xmlns:pvml="urn:schemas-microsoft-com:office:powerpoint" xmlns:com="http://schemas.openxmlformats.org/drawingml/2006/compatibility" xmlns:p14="http://schemas.microsoft.com/office/powerpoint/2010/main" xmlns:p15="http://schemas.microsoft.com/office/powerpoint/2012/main" xmlns:ahyp="http://schemas.microsoft.com/office/drawing/2018/hyperlinkcolor" matchingName="Section title and description">
+<p:sldLayout xmlns:a="http://schemas.openxmlformats.org/drawingml/2006/main" xmlns:r="http://schemas.openxmlformats.org/officeDocument/2006/relationships" xmlns:p="http://schemas.openxmlformats.org/presentationml/2006/main" matchingName="Section title and description">
   <p:cSld name="SECTION_TITLE_AND_DESCRIPTION">
     <p:spTree>
       <p:nvGrpSpPr>
-        <p:cNvPr id="41" name="Shape 41"/>
+        <p:cNvPr id="1" name="Shape 41"/>
         <p:cNvGrpSpPr/>
         <p:nvPr/>
       </p:nvGrpSpPr>
@@ -3941,12 +4048,12 @@
           </a:ln>
         </p:spPr>
         <p:txBody>
-          <a:bodyPr anchorCtr="0" anchor="ctr" bIns="91425" lIns="91425" spcFirstLastPara="1" rIns="91425" wrap="square" tIns="91425">
+          <a:bodyPr spcFirstLastPara="1" wrap="square" lIns="91425" tIns="91425" rIns="91425" bIns="91425" anchor="ctr" anchorCtr="0">
             <a:noAutofit/>
           </a:bodyPr>
           <a:lstStyle/>
           <a:p>
-            <a:pPr indent="0" lvl="0" marL="0" rtl="0" algn="l">
+            <a:pPr marL="0" lvl="0" indent="0" algn="l" rtl="0">
               <a:spcBef>
                 <a:spcPts val="0"/>
               </a:spcBef>
@@ -3955,9 +4062,6 @@
               </a:spcAft>
               <a:buNone/>
             </a:pPr>
-            <a:r>
-              <a:t/>
-            </a:r>
             <a:endParaRPr/>
           </a:p>
         </p:txBody>
@@ -3977,21 +4081,23 @@
             <a:avLst/>
           </a:prstGeom>
           <a:noFill/>
-          <a:ln cap="flat" cmpd="sng" w="19050">
+          <a:ln w="19050" cap="flat" cmpd="sng">
             <a:solidFill>
               <a:schemeClr val="lt1"/>
             </a:solidFill>
             <a:prstDash val="solid"/>
             <a:round/>
-            <a:headEnd len="sm" w="sm" type="none"/>
-            <a:tailEnd len="sm" w="sm" type="none"/>
+            <a:headEnd type="none" w="sm" len="sm"/>
+            <a:tailEnd type="none" w="sm" len="sm"/>
           </a:ln>
         </p:spPr>
       </p:cxnSp>
       <p:sp>
         <p:nvSpPr>
           <p:cNvPr id="44" name="Google Shape;44;p9"/>
-          <p:cNvSpPr txBox="1"/>
+          <p:cNvSpPr txBox="1">
+            <a:spLocks noGrp="1"/>
+          </p:cNvSpPr>
           <p:nvPr>
             <p:ph type="title"/>
           </p:nvPr>
@@ -4006,7 +4112,7 @@
           </a:prstGeom>
         </p:spPr>
         <p:txBody>
-          <a:bodyPr anchorCtr="0" anchor="b" bIns="91425" lIns="91425" spcFirstLastPara="1" rIns="91425" wrap="square" tIns="91425">
+          <a:bodyPr spcFirstLastPara="1" wrap="square" lIns="91425" tIns="91425" rIns="91425" bIns="91425" anchor="b" anchorCtr="0">
             <a:noAutofit/>
           </a:bodyPr>
           <a:lstStyle>
@@ -4173,15 +4279,19 @@
               </a:defRPr>
             </a:lvl9pPr>
           </a:lstStyle>
-          <a:p/>
+          <a:p>
+            <a:endParaRPr/>
+          </a:p>
         </p:txBody>
       </p:sp>
       <p:sp>
         <p:nvSpPr>
           <p:cNvPr id="45" name="Google Shape;45;p9"/>
-          <p:cNvSpPr txBox="1"/>
+          <p:cNvSpPr txBox="1">
+            <a:spLocks noGrp="1"/>
+          </p:cNvSpPr>
           <p:nvPr>
-            <p:ph idx="1" type="subTitle"/>
+            <p:ph type="subTitle" idx="1"/>
           </p:nvPr>
         </p:nvSpPr>
         <p:spPr>
@@ -4194,7 +4304,7 @@
           </a:prstGeom>
         </p:spPr>
         <p:txBody>
-          <a:bodyPr anchorCtr="0" anchor="t" bIns="91425" lIns="91425" spcFirstLastPara="1" rIns="91425" wrap="square" tIns="91425">
+          <a:bodyPr spcFirstLastPara="1" wrap="square" lIns="91425" tIns="91425" rIns="91425" bIns="91425" anchor="t" anchorCtr="0">
             <a:noAutofit/>
           </a:bodyPr>
           <a:lstStyle>
@@ -4379,15 +4489,19 @@
               </a:defRPr>
             </a:lvl9pPr>
           </a:lstStyle>
-          <a:p/>
+          <a:p>
+            <a:endParaRPr/>
+          </a:p>
         </p:txBody>
       </p:sp>
       <p:sp>
         <p:nvSpPr>
           <p:cNvPr id="46" name="Google Shape;46;p9"/>
-          <p:cNvSpPr txBox="1"/>
+          <p:cNvSpPr txBox="1">
+            <a:spLocks noGrp="1"/>
+          </p:cNvSpPr>
           <p:nvPr>
-            <p:ph idx="2" type="body"/>
+            <p:ph type="body" idx="2"/>
           </p:nvPr>
         </p:nvSpPr>
         <p:spPr>
@@ -4400,11 +4514,11 @@
           </a:prstGeom>
         </p:spPr>
         <p:txBody>
-          <a:bodyPr anchorCtr="0" anchor="ctr" bIns="91425" lIns="91425" spcFirstLastPara="1" rIns="91425" wrap="square" tIns="91425">
+          <a:bodyPr spcFirstLastPara="1" wrap="square" lIns="91425" tIns="91425" rIns="91425" bIns="91425" anchor="ctr" anchorCtr="0">
             <a:noAutofit/>
           </a:bodyPr>
           <a:lstStyle>
-            <a:lvl1pPr indent="-342900" lvl="0" marL="457200">
+            <a:lvl1pPr marL="457200" lvl="0" indent="-342900">
               <a:spcBef>
                 <a:spcPts val="0"/>
               </a:spcBef>
@@ -4422,7 +4536,7 @@
                 </a:solidFill>
               </a:defRPr>
             </a:lvl1pPr>
-            <a:lvl2pPr indent="-317500" lvl="1" marL="914400">
+            <a:lvl2pPr marL="914400" lvl="1" indent="-317500">
               <a:spcBef>
                 <a:spcPts val="1600"/>
               </a:spcBef>
@@ -4440,7 +4554,7 @@
                 </a:solidFill>
               </a:defRPr>
             </a:lvl2pPr>
-            <a:lvl3pPr indent="-317500" lvl="2" marL="1371600">
+            <a:lvl3pPr marL="1371600" lvl="2" indent="-317500">
               <a:spcBef>
                 <a:spcPts val="1600"/>
               </a:spcBef>
@@ -4458,7 +4572,7 @@
                 </a:solidFill>
               </a:defRPr>
             </a:lvl3pPr>
-            <a:lvl4pPr indent="-317500" lvl="3" marL="1828800">
+            <a:lvl4pPr marL="1828800" lvl="3" indent="-317500">
               <a:spcBef>
                 <a:spcPts val="1600"/>
               </a:spcBef>
@@ -4476,7 +4590,7 @@
                 </a:solidFill>
               </a:defRPr>
             </a:lvl4pPr>
-            <a:lvl5pPr indent="-317500" lvl="4" marL="2286000">
+            <a:lvl5pPr marL="2286000" lvl="4" indent="-317500">
               <a:spcBef>
                 <a:spcPts val="1600"/>
               </a:spcBef>
@@ -4494,7 +4608,7 @@
                 </a:solidFill>
               </a:defRPr>
             </a:lvl5pPr>
-            <a:lvl6pPr indent="-317500" lvl="5" marL="2743200">
+            <a:lvl6pPr marL="2743200" lvl="5" indent="-317500">
               <a:spcBef>
                 <a:spcPts val="1600"/>
               </a:spcBef>
@@ -4512,7 +4626,7 @@
                 </a:solidFill>
               </a:defRPr>
             </a:lvl6pPr>
-            <a:lvl7pPr indent="-317500" lvl="6" marL="3200400">
+            <a:lvl7pPr marL="3200400" lvl="6" indent="-317500">
               <a:spcBef>
                 <a:spcPts val="1600"/>
               </a:spcBef>
@@ -4530,7 +4644,7 @@
                 </a:solidFill>
               </a:defRPr>
             </a:lvl7pPr>
-            <a:lvl8pPr indent="-317500" lvl="7" marL="3657600">
+            <a:lvl8pPr marL="3657600" lvl="7" indent="-317500">
               <a:spcBef>
                 <a:spcPts val="1600"/>
               </a:spcBef>
@@ -4548,7 +4662,7 @@
                 </a:solidFill>
               </a:defRPr>
             </a:lvl8pPr>
-            <a:lvl9pPr indent="-317500" lvl="8" marL="4114800">
+            <a:lvl9pPr marL="4114800" lvl="8" indent="-317500">
               <a:spcBef>
                 <a:spcPts val="1600"/>
               </a:spcBef>
@@ -4567,15 +4681,19 @@
               </a:defRPr>
             </a:lvl9pPr>
           </a:lstStyle>
-          <a:p/>
+          <a:p>
+            <a:endParaRPr/>
+          </a:p>
         </p:txBody>
       </p:sp>
       <p:sp>
         <p:nvSpPr>
           <p:cNvPr id="47" name="Google Shape;47;p9"/>
-          <p:cNvSpPr txBox="1"/>
+          <p:cNvSpPr txBox="1">
+            <a:spLocks noGrp="1"/>
+          </p:cNvSpPr>
           <p:nvPr>
-            <p:ph idx="12" type="sldNum"/>
+            <p:ph type="sldNum" idx="12"/>
           </p:nvPr>
         </p:nvSpPr>
         <p:spPr>
@@ -4588,7 +4706,7 @@
           </a:prstGeom>
         </p:spPr>
         <p:txBody>
-          <a:bodyPr anchorCtr="0" anchor="ctr" bIns="91425" lIns="91425" spcFirstLastPara="1" rIns="91425" wrap="square" tIns="91425">
+          <a:bodyPr spcFirstLastPara="1" wrap="square" lIns="91425" tIns="91425" rIns="91425" bIns="91425" anchor="ctr" anchorCtr="0">
             <a:noAutofit/>
           </a:bodyPr>
           <a:lstStyle>
@@ -4666,7 +4784,7 @@
             </a:lvl9pPr>
           </a:lstStyle>
           <a:p>
-            <a:pPr indent="0" lvl="0" marL="0" rtl="0" algn="r">
+            <a:pPr marL="0" lvl="0" indent="0" algn="r" rtl="0">
               <a:spcBef>
                 <a:spcPts val="0"/>
               </a:spcBef>
@@ -4692,11 +4810,11 @@
 </file>
 
 <file path=ppt/slideLayouts/slideLayout9.xml><?xml version="1.0" encoding="utf-8"?>
-<p:sldLayout xmlns:a="http://schemas.openxmlformats.org/drawingml/2006/main" xmlns:r="http://schemas.openxmlformats.org/officeDocument/2006/relationships" xmlns:mc="http://schemas.openxmlformats.org/markup-compatibility/2006" xmlns:mv="urn:schemas-microsoft-com:mac:vml" xmlns:p="http://schemas.openxmlformats.org/presentationml/2006/main" xmlns:c="http://schemas.openxmlformats.org/drawingml/2006/chart" xmlns:dgm="http://schemas.openxmlformats.org/drawingml/2006/diagram" xmlns:o="urn:schemas-microsoft-com:office:office" xmlns:v="urn:schemas-microsoft-com:vml" xmlns:pvml="urn:schemas-microsoft-com:office:powerpoint" xmlns:com="http://schemas.openxmlformats.org/drawingml/2006/compatibility" xmlns:p14="http://schemas.microsoft.com/office/powerpoint/2010/main" xmlns:p15="http://schemas.microsoft.com/office/powerpoint/2012/main" xmlns:ahyp="http://schemas.microsoft.com/office/drawing/2018/hyperlinkcolor" matchingName="Caption">
+<p:sldLayout xmlns:a="http://schemas.openxmlformats.org/drawingml/2006/main" xmlns:r="http://schemas.openxmlformats.org/officeDocument/2006/relationships" xmlns:p="http://schemas.openxmlformats.org/presentationml/2006/main" matchingName="Caption">
   <p:cSld name="CAPTION_ONLY">
     <p:spTree>
       <p:nvGrpSpPr>
-        <p:cNvPr id="48" name="Shape 48"/>
+        <p:cNvPr id="1" name="Shape 48"/>
         <p:cNvGrpSpPr/>
         <p:nvPr/>
       </p:nvGrpSpPr>
@@ -4711,9 +4829,11 @@
       <p:sp>
         <p:nvSpPr>
           <p:cNvPr id="49" name="Google Shape;49;p10"/>
-          <p:cNvSpPr txBox="1"/>
+          <p:cNvSpPr txBox="1">
+            <a:spLocks noGrp="1"/>
+          </p:cNvSpPr>
           <p:nvPr>
-            <p:ph idx="1" type="body"/>
+            <p:ph type="body" idx="1"/>
           </p:nvPr>
         </p:nvSpPr>
         <p:spPr>
@@ -4726,11 +4846,11 @@
           </a:prstGeom>
         </p:spPr>
         <p:txBody>
-          <a:bodyPr anchorCtr="0" anchor="ctr" bIns="91425" lIns="91425" spcFirstLastPara="1" rIns="91425" wrap="square" tIns="91425">
+          <a:bodyPr spcFirstLastPara="1" wrap="square" lIns="91425" tIns="91425" rIns="91425" bIns="91425" anchor="ctr" anchorCtr="0">
             <a:noAutofit/>
           </a:bodyPr>
           <a:lstStyle>
-            <a:lvl1pPr indent="-228600" lvl="0" marL="457200">
+            <a:lvl1pPr marL="457200" lvl="0" indent="-228600">
               <a:lnSpc>
                 <a:spcPct val="100000"/>
               </a:lnSpc>
@@ -4751,15 +4871,19 @@
               </a:defRPr>
             </a:lvl1pPr>
           </a:lstStyle>
-          <a:p/>
+          <a:p>
+            <a:endParaRPr/>
+          </a:p>
         </p:txBody>
       </p:sp>
       <p:sp>
         <p:nvSpPr>
           <p:cNvPr id="50" name="Google Shape;50;p10"/>
-          <p:cNvSpPr txBox="1"/>
+          <p:cNvSpPr txBox="1">
+            <a:spLocks noGrp="1"/>
+          </p:cNvSpPr>
           <p:nvPr>
-            <p:ph idx="12" type="sldNum"/>
+            <p:ph type="sldNum" idx="12"/>
           </p:nvPr>
         </p:nvSpPr>
         <p:spPr>
@@ -4772,7 +4896,7 @@
           </a:prstGeom>
         </p:spPr>
         <p:txBody>
-          <a:bodyPr anchorCtr="0" anchor="ctr" bIns="91425" lIns="91425" spcFirstLastPara="1" rIns="91425" wrap="square" tIns="91425">
+          <a:bodyPr spcFirstLastPara="1" wrap="square" lIns="91425" tIns="91425" rIns="91425" bIns="91425" anchor="ctr" anchorCtr="0">
             <a:noAutofit/>
           </a:bodyPr>
           <a:lstStyle>
@@ -4814,7 +4938,7 @@
             </a:lvl9pPr>
           </a:lstStyle>
           <a:p>
-            <a:pPr indent="0" lvl="0" marL="0" rtl="0" algn="r">
+            <a:pPr marL="0" lvl="0" indent="0" algn="r" rtl="0">
               <a:spcBef>
                 <a:spcPts val="0"/>
               </a:spcBef>
@@ -4840,18 +4964,19 @@
 </file>
 
 <file path=ppt/slideMasters/slideMaster1.xml><?xml version="1.0" encoding="utf-8"?>
-<p:sldMaster xmlns:a="http://schemas.openxmlformats.org/drawingml/2006/main" xmlns:r="http://schemas.openxmlformats.org/officeDocument/2006/relationships" xmlns:mc="http://schemas.openxmlformats.org/markup-compatibility/2006" xmlns:mv="urn:schemas-microsoft-com:mac:vml" xmlns:p="http://schemas.openxmlformats.org/presentationml/2006/main" xmlns:c="http://schemas.openxmlformats.org/drawingml/2006/chart" xmlns:dgm="http://schemas.openxmlformats.org/drawingml/2006/diagram" xmlns:o="urn:schemas-microsoft-com:office:office" xmlns:v="urn:schemas-microsoft-com:vml" xmlns:pvml="urn:schemas-microsoft-com:office:powerpoint" xmlns:com="http://schemas.openxmlformats.org/drawingml/2006/compatibility" xmlns:p14="http://schemas.microsoft.com/office/powerpoint/2010/main" xmlns:p15="http://schemas.microsoft.com/office/powerpoint/2012/main" xmlns:ahyp="http://schemas.microsoft.com/office/drawing/2018/hyperlinkcolor">
+<p:sldMaster xmlns:a="http://schemas.openxmlformats.org/drawingml/2006/main" xmlns:r="http://schemas.openxmlformats.org/officeDocument/2006/relationships" xmlns:p="http://schemas.openxmlformats.org/presentationml/2006/main">
   <p:cSld name="luxe">
     <p:bg>
       <p:bgPr>
         <a:solidFill>
           <a:schemeClr val="lt1"/>
         </a:solidFill>
+        <a:effectLst/>
       </p:bgPr>
     </p:bg>
     <p:spTree>
       <p:nvGrpSpPr>
-        <p:cNvPr id="5" name="Shape 5"/>
+        <p:cNvPr id="1" name="Shape 5"/>
         <p:cNvGrpSpPr/>
         <p:nvPr/>
       </p:nvGrpSpPr>
@@ -4866,7 +4991,9 @@
       <p:sp>
         <p:nvSpPr>
           <p:cNvPr id="6" name="Google Shape;6;p1"/>
-          <p:cNvSpPr txBox="1"/>
+          <p:cNvSpPr txBox="1">
+            <a:spLocks noGrp="1"/>
+          </p:cNvSpPr>
           <p:nvPr>
             <p:ph type="title"/>
           </p:nvPr>
@@ -4885,7 +5012,7 @@
           </a:ln>
         </p:spPr>
         <p:txBody>
-          <a:bodyPr anchorCtr="0" anchor="b" bIns="91425" lIns="91425" spcFirstLastPara="1" rIns="91425" wrap="square" tIns="91425">
+          <a:bodyPr spcFirstLastPara="1" wrap="square" lIns="91425" tIns="91425" rIns="91425" bIns="91425" anchor="b" anchorCtr="0">
             <a:noAutofit/>
           </a:bodyPr>
           <a:lstStyle>
@@ -5097,15 +5224,19 @@
               </a:defRPr>
             </a:lvl9pPr>
           </a:lstStyle>
-          <a:p/>
+          <a:p>
+            <a:endParaRPr/>
+          </a:p>
         </p:txBody>
       </p:sp>
       <p:sp>
         <p:nvSpPr>
           <p:cNvPr id="7" name="Google Shape;7;p1"/>
-          <p:cNvSpPr txBox="1"/>
+          <p:cNvSpPr txBox="1">
+            <a:spLocks noGrp="1"/>
+          </p:cNvSpPr>
           <p:nvPr>
-            <p:ph idx="1" type="body"/>
+            <p:ph type="body" idx="1"/>
           </p:nvPr>
         </p:nvSpPr>
         <p:spPr>
@@ -5122,11 +5253,11 @@
           </a:ln>
         </p:spPr>
         <p:txBody>
-          <a:bodyPr anchorCtr="0" anchor="t" bIns="91425" lIns="91425" spcFirstLastPara="1" rIns="91425" wrap="square" tIns="91425">
+          <a:bodyPr spcFirstLastPara="1" wrap="square" lIns="91425" tIns="91425" rIns="91425" bIns="91425" anchor="t" anchorCtr="0">
             <a:noAutofit/>
           </a:bodyPr>
           <a:lstStyle>
-            <a:lvl1pPr indent="-342900" lvl="0" marL="457200">
+            <a:lvl1pPr marL="457200" lvl="0" indent="-342900">
               <a:lnSpc>
                 <a:spcPct val="115000"/>
               </a:lnSpc>
@@ -5152,7 +5283,7 @@
                 <a:sym typeface="Open Sans"/>
               </a:defRPr>
             </a:lvl1pPr>
-            <a:lvl2pPr indent="-317500" lvl="1" marL="914400">
+            <a:lvl2pPr marL="914400" lvl="1" indent="-317500">
               <a:lnSpc>
                 <a:spcPct val="115000"/>
               </a:lnSpc>
@@ -5178,7 +5309,7 @@
                 <a:sym typeface="Open Sans"/>
               </a:defRPr>
             </a:lvl2pPr>
-            <a:lvl3pPr indent="-317500" lvl="2" marL="1371600">
+            <a:lvl3pPr marL="1371600" lvl="2" indent="-317500">
               <a:lnSpc>
                 <a:spcPct val="115000"/>
               </a:lnSpc>
@@ -5204,7 +5335,7 @@
                 <a:sym typeface="Open Sans"/>
               </a:defRPr>
             </a:lvl3pPr>
-            <a:lvl4pPr indent="-317500" lvl="3" marL="1828800">
+            <a:lvl4pPr marL="1828800" lvl="3" indent="-317500">
               <a:lnSpc>
                 <a:spcPct val="115000"/>
               </a:lnSpc>
@@ -5230,7 +5361,7 @@
                 <a:sym typeface="Open Sans"/>
               </a:defRPr>
             </a:lvl4pPr>
-            <a:lvl5pPr indent="-317500" lvl="4" marL="2286000">
+            <a:lvl5pPr marL="2286000" lvl="4" indent="-317500">
               <a:lnSpc>
                 <a:spcPct val="115000"/>
               </a:lnSpc>
@@ -5256,7 +5387,7 @@
                 <a:sym typeface="Open Sans"/>
               </a:defRPr>
             </a:lvl5pPr>
-            <a:lvl6pPr indent="-317500" lvl="5" marL="2743200">
+            <a:lvl6pPr marL="2743200" lvl="5" indent="-317500">
               <a:lnSpc>
                 <a:spcPct val="115000"/>
               </a:lnSpc>
@@ -5282,7 +5413,7 @@
                 <a:sym typeface="Open Sans"/>
               </a:defRPr>
             </a:lvl6pPr>
-            <a:lvl7pPr indent="-317500" lvl="6" marL="3200400">
+            <a:lvl7pPr marL="3200400" lvl="6" indent="-317500">
               <a:lnSpc>
                 <a:spcPct val="115000"/>
               </a:lnSpc>
@@ -5308,7 +5439,7 @@
                 <a:sym typeface="Open Sans"/>
               </a:defRPr>
             </a:lvl7pPr>
-            <a:lvl8pPr indent="-317500" lvl="7" marL="3657600">
+            <a:lvl8pPr marL="3657600" lvl="7" indent="-317500">
               <a:lnSpc>
                 <a:spcPct val="115000"/>
               </a:lnSpc>
@@ -5334,7 +5465,7 @@
                 <a:sym typeface="Open Sans"/>
               </a:defRPr>
             </a:lvl8pPr>
-            <a:lvl9pPr indent="-317500" lvl="8" marL="4114800">
+            <a:lvl9pPr marL="4114800" lvl="8" indent="-317500">
               <a:lnSpc>
                 <a:spcPct val="115000"/>
               </a:lnSpc>
@@ -5361,15 +5492,19 @@
               </a:defRPr>
             </a:lvl9pPr>
           </a:lstStyle>
-          <a:p/>
+          <a:p>
+            <a:endParaRPr/>
+          </a:p>
         </p:txBody>
       </p:sp>
       <p:sp>
         <p:nvSpPr>
           <p:cNvPr id="8" name="Google Shape;8;p1"/>
-          <p:cNvSpPr txBox="1"/>
+          <p:cNvSpPr txBox="1">
+            <a:spLocks noGrp="1"/>
+          </p:cNvSpPr>
           <p:nvPr>
-            <p:ph idx="12" type="sldNum"/>
+            <p:ph type="sldNum" idx="12"/>
           </p:nvPr>
         </p:nvSpPr>
         <p:spPr>
@@ -5386,7 +5521,7 @@
           </a:ln>
         </p:spPr>
         <p:txBody>
-          <a:bodyPr anchorCtr="0" anchor="ctr" bIns="91425" lIns="91425" spcFirstLastPara="1" rIns="91425" wrap="square" tIns="91425">
+          <a:bodyPr spcFirstLastPara="1" wrap="square" lIns="91425" tIns="91425" rIns="91425" bIns="91425" anchor="ctr" anchorCtr="0">
             <a:noAutofit/>
           </a:bodyPr>
           <a:lstStyle>
@@ -5500,7 +5635,7 @@
             </a:lvl9pPr>
           </a:lstStyle>
           <a:p>
-            <a:pPr indent="0" lvl="0" marL="0" rtl="0" algn="r">
+            <a:pPr marL="0" lvl="0" indent="0" algn="r" rtl="0">
               <a:spcBef>
                 <a:spcPts val="0"/>
               </a:spcBef>
@@ -5519,7 +5654,7 @@
       </p:sp>
     </p:spTree>
   </p:cSld>
-  <p:clrMap accent1="accent1" accent2="accent2" accent3="accent3" accent4="accent4" accent5="accent5" accent6="accent6" bg1="lt1" bg2="dk2" tx1="dk1" tx2="lt2" folHlink="folHlink" hlink="hlink"/>
+  <p:clrMap bg1="lt1" tx1="dk1" bg2="dk2" tx2="lt2" accent1="accent1" accent2="accent2" accent3="accent3" accent4="accent4" accent5="accent5" accent6="accent6" hlink="hlink" folHlink="folHlink"/>
   <p:sldLayoutIdLst>
     <p:sldLayoutId id="2147483648" r:id="rId1"/>
     <p:sldLayoutId id="2147483649" r:id="rId2"/>
@@ -5533,10 +5668,10 @@
     <p:sldLayoutId id="2147483657" r:id="rId10"/>
     <p:sldLayoutId id="2147483658" r:id="rId11"/>
   </p:sldLayoutIdLst>
-  <p:hf dt="0" ftr="0" hdr="0" sldNum="0"/>
+  <p:hf sldNum="0" hdr="0" ftr="0" dt="0"/>
   <p:txStyles>
     <p:titleStyle>
-      <a:defPPr lvl="0" marR="0" rtl="0" algn="l">
+      <a:defPPr marR="0" lvl="0" algn="l" rtl="0">
         <a:lnSpc>
           <a:spcPct val="100000"/>
         </a:lnSpc>
@@ -5547,7 +5682,7 @@
           <a:spcPts val="0"/>
         </a:spcAft>
       </a:defPPr>
-      <a:lvl1pPr lvl="0" marR="0" rtl="0" algn="l">
+      <a:lvl1pPr marR="0" lvl="0" algn="l" rtl="0">
         <a:lnSpc>
           <a:spcPct val="100000"/>
         </a:lnSpc>
@@ -5561,7 +5696,7 @@
           <a:srgbClr val="000000"/>
         </a:buClr>
         <a:buFont typeface="Arial"/>
-        <a:defRPr b="0" i="0" sz="1400" u="none" cap="none" strike="noStrike">
+        <a:defRPr sz="1400" b="0" i="0" u="none" strike="noStrike" cap="none">
           <a:solidFill>
             <a:srgbClr val="000000"/>
           </a:solidFill>
@@ -5571,7 +5706,7 @@
           <a:sym typeface="Arial"/>
         </a:defRPr>
       </a:lvl1pPr>
-      <a:lvl2pPr lvl="1" marR="0" rtl="0" algn="l">
+      <a:lvl2pPr marR="0" lvl="1" algn="l" rtl="0">
         <a:lnSpc>
           <a:spcPct val="100000"/>
         </a:lnSpc>
@@ -5585,7 +5720,7 @@
           <a:srgbClr val="000000"/>
         </a:buClr>
         <a:buFont typeface="Arial"/>
-        <a:defRPr b="0" i="0" sz="1400" u="none" cap="none" strike="noStrike">
+        <a:defRPr sz="1400" b="0" i="0" u="none" strike="noStrike" cap="none">
           <a:solidFill>
             <a:srgbClr val="000000"/>
           </a:solidFill>
@@ -5595,7 +5730,7 @@
           <a:sym typeface="Arial"/>
         </a:defRPr>
       </a:lvl2pPr>
-      <a:lvl3pPr lvl="2" marR="0" rtl="0" algn="l">
+      <a:lvl3pPr marR="0" lvl="2" algn="l" rtl="0">
         <a:lnSpc>
           <a:spcPct val="100000"/>
         </a:lnSpc>
@@ -5609,7 +5744,7 @@
           <a:srgbClr val="000000"/>
         </a:buClr>
         <a:buFont typeface="Arial"/>
-        <a:defRPr b="0" i="0" sz="1400" u="none" cap="none" strike="noStrike">
+        <a:defRPr sz="1400" b="0" i="0" u="none" strike="noStrike" cap="none">
           <a:solidFill>
             <a:srgbClr val="000000"/>
           </a:solidFill>
@@ -5619,7 +5754,7 @@
           <a:sym typeface="Arial"/>
         </a:defRPr>
       </a:lvl3pPr>
-      <a:lvl4pPr lvl="3" marR="0" rtl="0" algn="l">
+      <a:lvl4pPr marR="0" lvl="3" algn="l" rtl="0">
         <a:lnSpc>
           <a:spcPct val="100000"/>
         </a:lnSpc>
@@ -5633,7 +5768,7 @@
           <a:srgbClr val="000000"/>
         </a:buClr>
         <a:buFont typeface="Arial"/>
-        <a:defRPr b="0" i="0" sz="1400" u="none" cap="none" strike="noStrike">
+        <a:defRPr sz="1400" b="0" i="0" u="none" strike="noStrike" cap="none">
           <a:solidFill>
             <a:srgbClr val="000000"/>
           </a:solidFill>
@@ -5643,7 +5778,7 @@
           <a:sym typeface="Arial"/>
         </a:defRPr>
       </a:lvl4pPr>
-      <a:lvl5pPr lvl="4" marR="0" rtl="0" algn="l">
+      <a:lvl5pPr marR="0" lvl="4" algn="l" rtl="0">
         <a:lnSpc>
           <a:spcPct val="100000"/>
         </a:lnSpc>
@@ -5657,7 +5792,7 @@
           <a:srgbClr val="000000"/>
         </a:buClr>
         <a:buFont typeface="Arial"/>
-        <a:defRPr b="0" i="0" sz="1400" u="none" cap="none" strike="noStrike">
+        <a:defRPr sz="1400" b="0" i="0" u="none" strike="noStrike" cap="none">
           <a:solidFill>
             <a:srgbClr val="000000"/>
           </a:solidFill>
@@ -5667,7 +5802,7 @@
           <a:sym typeface="Arial"/>
         </a:defRPr>
       </a:lvl5pPr>
-      <a:lvl6pPr lvl="5" marR="0" rtl="0" algn="l">
+      <a:lvl6pPr marR="0" lvl="5" algn="l" rtl="0">
         <a:lnSpc>
           <a:spcPct val="100000"/>
         </a:lnSpc>
@@ -5681,7 +5816,7 @@
           <a:srgbClr val="000000"/>
         </a:buClr>
         <a:buFont typeface="Arial"/>
-        <a:defRPr b="0" i="0" sz="1400" u="none" cap="none" strike="noStrike">
+        <a:defRPr sz="1400" b="0" i="0" u="none" strike="noStrike" cap="none">
           <a:solidFill>
             <a:srgbClr val="000000"/>
           </a:solidFill>
@@ -5691,7 +5826,7 @@
           <a:sym typeface="Arial"/>
         </a:defRPr>
       </a:lvl6pPr>
-      <a:lvl7pPr lvl="6" marR="0" rtl="0" algn="l">
+      <a:lvl7pPr marR="0" lvl="6" algn="l" rtl="0">
         <a:lnSpc>
           <a:spcPct val="100000"/>
         </a:lnSpc>
@@ -5705,7 +5840,7 @@
           <a:srgbClr val="000000"/>
         </a:buClr>
         <a:buFont typeface="Arial"/>
-        <a:defRPr b="0" i="0" sz="1400" u="none" cap="none" strike="noStrike">
+        <a:defRPr sz="1400" b="0" i="0" u="none" strike="noStrike" cap="none">
           <a:solidFill>
             <a:srgbClr val="000000"/>
           </a:solidFill>
@@ -5715,7 +5850,7 @@
           <a:sym typeface="Arial"/>
         </a:defRPr>
       </a:lvl7pPr>
-      <a:lvl8pPr lvl="7" marR="0" rtl="0" algn="l">
+      <a:lvl8pPr marR="0" lvl="7" algn="l" rtl="0">
         <a:lnSpc>
           <a:spcPct val="100000"/>
         </a:lnSpc>
@@ -5729,7 +5864,7 @@
           <a:srgbClr val="000000"/>
         </a:buClr>
         <a:buFont typeface="Arial"/>
-        <a:defRPr b="0" i="0" sz="1400" u="none" cap="none" strike="noStrike">
+        <a:defRPr sz="1400" b="0" i="0" u="none" strike="noStrike" cap="none">
           <a:solidFill>
             <a:srgbClr val="000000"/>
           </a:solidFill>
@@ -5739,7 +5874,7 @@
           <a:sym typeface="Arial"/>
         </a:defRPr>
       </a:lvl8pPr>
-      <a:lvl9pPr lvl="8" marR="0" rtl="0" algn="l">
+      <a:lvl9pPr marR="0" lvl="8" algn="l" rtl="0">
         <a:lnSpc>
           <a:spcPct val="100000"/>
         </a:lnSpc>
@@ -5753,7 +5888,7 @@
           <a:srgbClr val="000000"/>
         </a:buClr>
         <a:buFont typeface="Arial"/>
-        <a:defRPr b="0" i="0" sz="1400" u="none" cap="none" strike="noStrike">
+        <a:defRPr sz="1400" b="0" i="0" u="none" strike="noStrike" cap="none">
           <a:solidFill>
             <a:srgbClr val="000000"/>
           </a:solidFill>
@@ -5765,7 +5900,7 @@
       </a:lvl9pPr>
     </p:titleStyle>
     <p:bodyStyle>
-      <a:defPPr lvl="0" marR="0" rtl="0" algn="l">
+      <a:defPPr marR="0" lvl="0" algn="l" rtl="0">
         <a:lnSpc>
           <a:spcPct val="100000"/>
         </a:lnSpc>
@@ -5776,7 +5911,7 @@
           <a:spcPts val="0"/>
         </a:spcAft>
       </a:defPPr>
-      <a:lvl1pPr lvl="0" marR="0" rtl="0" algn="l">
+      <a:lvl1pPr marR="0" lvl="0" algn="l" rtl="0">
         <a:lnSpc>
           <a:spcPct val="100000"/>
         </a:lnSpc>
@@ -5790,7 +5925,7 @@
           <a:srgbClr val="000000"/>
         </a:buClr>
         <a:buFont typeface="Arial"/>
-        <a:defRPr b="0" i="0" sz="1400" u="none" cap="none" strike="noStrike">
+        <a:defRPr sz="1400" b="0" i="0" u="none" strike="noStrike" cap="none">
           <a:solidFill>
             <a:srgbClr val="000000"/>
           </a:solidFill>
@@ -5800,7 +5935,7 @@
           <a:sym typeface="Arial"/>
         </a:defRPr>
       </a:lvl1pPr>
-      <a:lvl2pPr lvl="1" marR="0" rtl="0" algn="l">
+      <a:lvl2pPr marR="0" lvl="1" algn="l" rtl="0">
         <a:lnSpc>
           <a:spcPct val="100000"/>
         </a:lnSpc>
@@ -5814,7 +5949,7 @@
           <a:srgbClr val="000000"/>
         </a:buClr>
         <a:buFont typeface="Arial"/>
-        <a:defRPr b="0" i="0" sz="1400" u="none" cap="none" strike="noStrike">
+        <a:defRPr sz="1400" b="0" i="0" u="none" strike="noStrike" cap="none">
           <a:solidFill>
             <a:srgbClr val="000000"/>
           </a:solidFill>
@@ -5824,7 +5959,7 @@
           <a:sym typeface="Arial"/>
         </a:defRPr>
       </a:lvl2pPr>
-      <a:lvl3pPr lvl="2" marR="0" rtl="0" algn="l">
+      <a:lvl3pPr marR="0" lvl="2" algn="l" rtl="0">
         <a:lnSpc>
           <a:spcPct val="100000"/>
         </a:lnSpc>
@@ -5838,7 +5973,7 @@
           <a:srgbClr val="000000"/>
         </a:buClr>
         <a:buFont typeface="Arial"/>
-        <a:defRPr b="0" i="0" sz="1400" u="none" cap="none" strike="noStrike">
+        <a:defRPr sz="1400" b="0" i="0" u="none" strike="noStrike" cap="none">
           <a:solidFill>
             <a:srgbClr val="000000"/>
           </a:solidFill>
@@ -5848,7 +5983,7 @@
           <a:sym typeface="Arial"/>
         </a:defRPr>
       </a:lvl3pPr>
-      <a:lvl4pPr lvl="3" marR="0" rtl="0" algn="l">
+      <a:lvl4pPr marR="0" lvl="3" algn="l" rtl="0">
         <a:lnSpc>
           <a:spcPct val="100000"/>
         </a:lnSpc>
@@ -5862,7 +5997,7 @@
           <a:srgbClr val="000000"/>
         </a:buClr>
         <a:buFont typeface="Arial"/>
-        <a:defRPr b="0" i="0" sz="1400" u="none" cap="none" strike="noStrike">
+        <a:defRPr sz="1400" b="0" i="0" u="none" strike="noStrike" cap="none">
           <a:solidFill>
             <a:srgbClr val="000000"/>
           </a:solidFill>
@@ -5872,7 +6007,7 @@
           <a:sym typeface="Arial"/>
         </a:defRPr>
       </a:lvl4pPr>
-      <a:lvl5pPr lvl="4" marR="0" rtl="0" algn="l">
+      <a:lvl5pPr marR="0" lvl="4" algn="l" rtl="0">
         <a:lnSpc>
           <a:spcPct val="100000"/>
         </a:lnSpc>
@@ -5886,7 +6021,7 @@
           <a:srgbClr val="000000"/>
         </a:buClr>
         <a:buFont typeface="Arial"/>
-        <a:defRPr b="0" i="0" sz="1400" u="none" cap="none" strike="noStrike">
+        <a:defRPr sz="1400" b="0" i="0" u="none" strike="noStrike" cap="none">
           <a:solidFill>
             <a:srgbClr val="000000"/>
           </a:solidFill>
@@ -5896,7 +6031,7 @@
           <a:sym typeface="Arial"/>
         </a:defRPr>
       </a:lvl5pPr>
-      <a:lvl6pPr lvl="5" marR="0" rtl="0" algn="l">
+      <a:lvl6pPr marR="0" lvl="5" algn="l" rtl="0">
         <a:lnSpc>
           <a:spcPct val="100000"/>
         </a:lnSpc>
@@ -5910,7 +6045,7 @@
           <a:srgbClr val="000000"/>
         </a:buClr>
         <a:buFont typeface="Arial"/>
-        <a:defRPr b="0" i="0" sz="1400" u="none" cap="none" strike="noStrike">
+        <a:defRPr sz="1400" b="0" i="0" u="none" strike="noStrike" cap="none">
           <a:solidFill>
             <a:srgbClr val="000000"/>
           </a:solidFill>
@@ -5920,7 +6055,7 @@
           <a:sym typeface="Arial"/>
         </a:defRPr>
       </a:lvl6pPr>
-      <a:lvl7pPr lvl="6" marR="0" rtl="0" algn="l">
+      <a:lvl7pPr marR="0" lvl="6" algn="l" rtl="0">
         <a:lnSpc>
           <a:spcPct val="100000"/>
         </a:lnSpc>
@@ -5934,7 +6069,7 @@
           <a:srgbClr val="000000"/>
         </a:buClr>
         <a:buFont typeface="Arial"/>
-        <a:defRPr b="0" i="0" sz="1400" u="none" cap="none" strike="noStrike">
+        <a:defRPr sz="1400" b="0" i="0" u="none" strike="noStrike" cap="none">
           <a:solidFill>
             <a:srgbClr val="000000"/>
           </a:solidFill>
@@ -5944,7 +6079,7 @@
           <a:sym typeface="Arial"/>
         </a:defRPr>
       </a:lvl7pPr>
-      <a:lvl8pPr lvl="7" marR="0" rtl="0" algn="l">
+      <a:lvl8pPr marR="0" lvl="7" algn="l" rtl="0">
         <a:lnSpc>
           <a:spcPct val="100000"/>
         </a:lnSpc>
@@ -5958,7 +6093,7 @@
           <a:srgbClr val="000000"/>
         </a:buClr>
         <a:buFont typeface="Arial"/>
-        <a:defRPr b="0" i="0" sz="1400" u="none" cap="none" strike="noStrike">
+        <a:defRPr sz="1400" b="0" i="0" u="none" strike="noStrike" cap="none">
           <a:solidFill>
             <a:srgbClr val="000000"/>
           </a:solidFill>
@@ -5968,7 +6103,7 @@
           <a:sym typeface="Arial"/>
         </a:defRPr>
       </a:lvl8pPr>
-      <a:lvl9pPr lvl="8" marR="0" rtl="0" algn="l">
+      <a:lvl9pPr marR="0" lvl="8" algn="l" rtl="0">
         <a:lnSpc>
           <a:spcPct val="100000"/>
         </a:lnSpc>
@@ -5982,7 +6117,7 @@
           <a:srgbClr val="000000"/>
         </a:buClr>
         <a:buFont typeface="Arial"/>
-        <a:defRPr b="0" i="0" sz="1400" u="none" cap="none" strike="noStrike">
+        <a:defRPr sz="1400" b="0" i="0" u="none" strike="noStrike" cap="none">
           <a:solidFill>
             <a:srgbClr val="000000"/>
           </a:solidFill>
@@ -5994,7 +6129,7 @@
       </a:lvl9pPr>
     </p:bodyStyle>
     <p:otherStyle>
-      <a:defPPr lvl="0" marR="0" rtl="0" algn="l">
+      <a:defPPr marR="0" lvl="0" algn="l" rtl="0">
         <a:lnSpc>
           <a:spcPct val="100000"/>
         </a:lnSpc>
@@ -6005,7 +6140,7 @@
           <a:spcPts val="0"/>
         </a:spcAft>
       </a:defPPr>
-      <a:lvl1pPr lvl="0" marR="0" rtl="0" algn="l">
+      <a:lvl1pPr marR="0" lvl="0" algn="l" rtl="0">
         <a:lnSpc>
           <a:spcPct val="100000"/>
         </a:lnSpc>
@@ -6019,7 +6154,7 @@
           <a:srgbClr val="000000"/>
         </a:buClr>
         <a:buFont typeface="Arial"/>
-        <a:defRPr b="0" i="0" sz="1400" u="none" cap="none" strike="noStrike">
+        <a:defRPr sz="1400" b="0" i="0" u="none" strike="noStrike" cap="none">
           <a:solidFill>
             <a:srgbClr val="000000"/>
           </a:solidFill>
@@ -6029,7 +6164,7 @@
           <a:sym typeface="Arial"/>
         </a:defRPr>
       </a:lvl1pPr>
-      <a:lvl2pPr lvl="1" marR="0" rtl="0" algn="l">
+      <a:lvl2pPr marR="0" lvl="1" algn="l" rtl="0">
         <a:lnSpc>
           <a:spcPct val="100000"/>
         </a:lnSpc>
@@ -6043,7 +6178,7 @@
           <a:srgbClr val="000000"/>
         </a:buClr>
         <a:buFont typeface="Arial"/>
-        <a:defRPr b="0" i="0" sz="1400" u="none" cap="none" strike="noStrike">
+        <a:defRPr sz="1400" b="0" i="0" u="none" strike="noStrike" cap="none">
           <a:solidFill>
             <a:srgbClr val="000000"/>
           </a:solidFill>
@@ -6053,7 +6188,7 @@
           <a:sym typeface="Arial"/>
         </a:defRPr>
       </a:lvl2pPr>
-      <a:lvl3pPr lvl="2" marR="0" rtl="0" algn="l">
+      <a:lvl3pPr marR="0" lvl="2" algn="l" rtl="0">
         <a:lnSpc>
           <a:spcPct val="100000"/>
         </a:lnSpc>
@@ -6067,7 +6202,7 @@
           <a:srgbClr val="000000"/>
         </a:buClr>
         <a:buFont typeface="Arial"/>
-        <a:defRPr b="0" i="0" sz="1400" u="none" cap="none" strike="noStrike">
+        <a:defRPr sz="1400" b="0" i="0" u="none" strike="noStrike" cap="none">
           <a:solidFill>
             <a:srgbClr val="000000"/>
           </a:solidFill>
@@ -6077,7 +6212,7 @@
           <a:sym typeface="Arial"/>
         </a:defRPr>
       </a:lvl3pPr>
-      <a:lvl4pPr lvl="3" marR="0" rtl="0" algn="l">
+      <a:lvl4pPr marR="0" lvl="3" algn="l" rtl="0">
         <a:lnSpc>
           <a:spcPct val="100000"/>
         </a:lnSpc>
@@ -6091,7 +6226,7 @@
           <a:srgbClr val="000000"/>
         </a:buClr>
         <a:buFont typeface="Arial"/>
-        <a:defRPr b="0" i="0" sz="1400" u="none" cap="none" strike="noStrike">
+        <a:defRPr sz="1400" b="0" i="0" u="none" strike="noStrike" cap="none">
           <a:solidFill>
             <a:srgbClr val="000000"/>
           </a:solidFill>
@@ -6101,7 +6236,7 @@
           <a:sym typeface="Arial"/>
         </a:defRPr>
       </a:lvl4pPr>
-      <a:lvl5pPr lvl="4" marR="0" rtl="0" algn="l">
+      <a:lvl5pPr marR="0" lvl="4" algn="l" rtl="0">
         <a:lnSpc>
           <a:spcPct val="100000"/>
         </a:lnSpc>
@@ -6115,7 +6250,7 @@
           <a:srgbClr val="000000"/>
         </a:buClr>
         <a:buFont typeface="Arial"/>
-        <a:defRPr b="0" i="0" sz="1400" u="none" cap="none" strike="noStrike">
+        <a:defRPr sz="1400" b="0" i="0" u="none" strike="noStrike" cap="none">
           <a:solidFill>
             <a:srgbClr val="000000"/>
           </a:solidFill>
@@ -6125,7 +6260,7 @@
           <a:sym typeface="Arial"/>
         </a:defRPr>
       </a:lvl5pPr>
-      <a:lvl6pPr lvl="5" marR="0" rtl="0" algn="l">
+      <a:lvl6pPr marR="0" lvl="5" algn="l" rtl="0">
         <a:lnSpc>
           <a:spcPct val="100000"/>
         </a:lnSpc>
@@ -6139,7 +6274,7 @@
           <a:srgbClr val="000000"/>
         </a:buClr>
         <a:buFont typeface="Arial"/>
-        <a:defRPr b="0" i="0" sz="1400" u="none" cap="none" strike="noStrike">
+        <a:defRPr sz="1400" b="0" i="0" u="none" strike="noStrike" cap="none">
           <a:solidFill>
             <a:srgbClr val="000000"/>
           </a:solidFill>
@@ -6149,7 +6284,7 @@
           <a:sym typeface="Arial"/>
         </a:defRPr>
       </a:lvl6pPr>
-      <a:lvl7pPr lvl="6" marR="0" rtl="0" algn="l">
+      <a:lvl7pPr marR="0" lvl="6" algn="l" rtl="0">
         <a:lnSpc>
           <a:spcPct val="100000"/>
         </a:lnSpc>
@@ -6163,7 +6298,7 @@
           <a:srgbClr val="000000"/>
         </a:buClr>
         <a:buFont typeface="Arial"/>
-        <a:defRPr b="0" i="0" sz="1400" u="none" cap="none" strike="noStrike">
+        <a:defRPr sz="1400" b="0" i="0" u="none" strike="noStrike" cap="none">
           <a:solidFill>
             <a:srgbClr val="000000"/>
           </a:solidFill>
@@ -6173,7 +6308,7 @@
           <a:sym typeface="Arial"/>
         </a:defRPr>
       </a:lvl7pPr>
-      <a:lvl8pPr lvl="7" marR="0" rtl="0" algn="l">
+      <a:lvl8pPr marR="0" lvl="7" algn="l" rtl="0">
         <a:lnSpc>
           <a:spcPct val="100000"/>
         </a:lnSpc>
@@ -6187,7 +6322,7 @@
           <a:srgbClr val="000000"/>
         </a:buClr>
         <a:buFont typeface="Arial"/>
-        <a:defRPr b="0" i="0" sz="1400" u="none" cap="none" strike="noStrike">
+        <a:defRPr sz="1400" b="0" i="0" u="none" strike="noStrike" cap="none">
           <a:solidFill>
             <a:srgbClr val="000000"/>
           </a:solidFill>
@@ -6197,7 +6332,7 @@
           <a:sym typeface="Arial"/>
         </a:defRPr>
       </a:lvl8pPr>
-      <a:lvl9pPr lvl="8" marR="0" rtl="0" algn="l">
+      <a:lvl9pPr marR="0" lvl="8" algn="l" rtl="0">
         <a:lnSpc>
           <a:spcPct val="100000"/>
         </a:lnSpc>
@@ -6211,7 +6346,7 @@
           <a:srgbClr val="000000"/>
         </a:buClr>
         <a:buFont typeface="Arial"/>
-        <a:defRPr b="0" i="0" sz="1400" u="none" cap="none" strike="noStrike">
+        <a:defRPr sz="1400" b="0" i="0" u="none" strike="noStrike" cap="none">
           <a:solidFill>
             <a:srgbClr val="000000"/>
           </a:solidFill>
@@ -6227,11 +6362,11 @@
 </file>
 
 <file path=ppt/slides/slide1.xml><?xml version="1.0" encoding="utf-8"?>
-<p:sld xmlns:a="http://schemas.openxmlformats.org/drawingml/2006/main" xmlns:r="http://schemas.openxmlformats.org/officeDocument/2006/relationships" xmlns:mc="http://schemas.openxmlformats.org/markup-compatibility/2006" xmlns:mv="urn:schemas-microsoft-com:mac:vml" xmlns:p="http://schemas.openxmlformats.org/presentationml/2006/main" xmlns:c="http://schemas.openxmlformats.org/drawingml/2006/chart" xmlns:dgm="http://schemas.openxmlformats.org/drawingml/2006/diagram" xmlns:o="urn:schemas-microsoft-com:office:office" xmlns:v="urn:schemas-microsoft-com:vml" xmlns:pvml="urn:schemas-microsoft-com:office:powerpoint" xmlns:com="http://schemas.openxmlformats.org/drawingml/2006/compatibility" xmlns:p14="http://schemas.microsoft.com/office/powerpoint/2010/main" xmlns:p15="http://schemas.microsoft.com/office/powerpoint/2012/main" xmlns:ahyp="http://schemas.microsoft.com/office/drawing/2018/hyperlinkcolor">
+<p:sld xmlns:a="http://schemas.openxmlformats.org/drawingml/2006/main" xmlns:r="http://schemas.openxmlformats.org/officeDocument/2006/relationships" xmlns:p="http://schemas.openxmlformats.org/presentationml/2006/main">
   <p:cSld>
     <p:spTree>
       <p:nvGrpSpPr>
-        <p:cNvPr id="61" name="Shape 61"/>
+        <p:cNvPr id="1" name="Shape 61"/>
         <p:cNvGrpSpPr/>
         <p:nvPr/>
       </p:nvGrpSpPr>
@@ -6246,7 +6381,9 @@
       <p:sp>
         <p:nvSpPr>
           <p:cNvPr id="62" name="Google Shape;62;p13"/>
-          <p:cNvSpPr txBox="1"/>
+          <p:cNvSpPr txBox="1">
+            <a:spLocks noGrp="1"/>
+          </p:cNvSpPr>
           <p:nvPr>
             <p:ph type="title"/>
           </p:nvPr>
@@ -6261,12 +6398,12 @@
           </a:prstGeom>
         </p:spPr>
         <p:txBody>
-          <a:bodyPr anchorCtr="0" anchor="t" bIns="91425" lIns="91425" spcFirstLastPara="1" rIns="91425" wrap="square" tIns="91425">
+          <a:bodyPr spcFirstLastPara="1" wrap="square" lIns="91425" tIns="91425" rIns="91425" bIns="91425" anchor="t" anchorCtr="0">
             <a:noAutofit/>
           </a:bodyPr>
           <a:lstStyle/>
           <a:p>
-            <a:pPr indent="0" lvl="0" marL="0" rtl="0" algn="ctr">
+            <a:pPr marL="0" lvl="0" indent="0" algn="ctr" rtl="0">
               <a:spcBef>
                 <a:spcPts val="0"/>
               </a:spcBef>
@@ -6282,7 +6419,7 @@
             <a:endParaRPr/>
           </a:p>
           <a:p>
-            <a:pPr indent="0" lvl="0" marL="0" rtl="0" algn="ctr">
+            <a:pPr marL="0" lvl="0" indent="0" algn="ctr" rtl="0">
               <a:spcBef>
                 <a:spcPts val="0"/>
               </a:spcBef>
@@ -6291,9 +6428,6 @@
               </a:spcAft>
               <a:buNone/>
             </a:pPr>
-            <a:r>
-              <a:t/>
-            </a:r>
             <a:endParaRPr/>
           </a:p>
         </p:txBody>
@@ -6313,14 +6447,14 @@
             <a:avLst/>
           </a:prstGeom>
           <a:noFill/>
-          <a:ln cap="flat" cmpd="sng" w="28575">
+          <a:ln w="28575" cap="flat" cmpd="sng">
             <a:solidFill>
               <a:schemeClr val="lt2"/>
             </a:solidFill>
             <a:prstDash val="solid"/>
             <a:round/>
-            <a:headEnd len="sm" w="sm" type="none"/>
-            <a:tailEnd len="sm" w="sm" type="none"/>
+            <a:headEnd type="none" w="sm" len="sm"/>
+            <a:tailEnd type="none" w="sm" len="sm"/>
           </a:ln>
         </p:spPr>
       </p:cxnSp>
@@ -6353,23 +6487,23 @@
               <a:avLst/>
             </a:prstGeom>
             <a:noFill/>
-            <a:ln cap="flat" cmpd="sng" w="9525">
+            <a:ln w="9525" cap="flat" cmpd="sng">
               <a:solidFill>
                 <a:schemeClr val="lt2"/>
               </a:solidFill>
               <a:prstDash val="solid"/>
               <a:round/>
-              <a:headEnd len="sm" w="sm" type="none"/>
-              <a:tailEnd len="sm" w="sm" type="none"/>
+              <a:headEnd type="none" w="sm" len="sm"/>
+              <a:tailEnd type="none" w="sm" len="sm"/>
             </a:ln>
           </p:spPr>
           <p:txBody>
-            <a:bodyPr anchorCtr="0" anchor="ctr" bIns="91425" lIns="91425" spcFirstLastPara="1" rIns="91425" wrap="square" tIns="91425">
+            <a:bodyPr spcFirstLastPara="1" wrap="square" lIns="91425" tIns="91425" rIns="91425" bIns="91425" anchor="ctr" anchorCtr="0">
               <a:noAutofit/>
             </a:bodyPr>
             <a:lstStyle/>
             <a:p>
-              <a:pPr indent="0" lvl="0" marL="0" rtl="0" algn="l">
+              <a:pPr marL="0" lvl="0" indent="0" algn="l" rtl="0">
                 <a:spcBef>
                   <a:spcPts val="0"/>
                 </a:spcBef>
@@ -6378,9 +6512,6 @@
                 </a:spcAft>
                 <a:buNone/>
               </a:pPr>
-              <a:r>
-                <a:t/>
-              </a:r>
               <a:endParaRPr/>
             </a:p>
           </p:txBody>
@@ -6407,12 +6538,12 @@
             </a:ln>
           </p:spPr>
           <p:txBody>
-            <a:bodyPr anchorCtr="0" anchor="ctr" bIns="91425" lIns="91425" spcFirstLastPara="1" rIns="91425" wrap="square" tIns="91425">
+            <a:bodyPr spcFirstLastPara="1" wrap="square" lIns="91425" tIns="91425" rIns="91425" bIns="91425" anchor="ctr" anchorCtr="0">
               <a:noAutofit/>
             </a:bodyPr>
             <a:lstStyle/>
             <a:p>
-              <a:pPr indent="0" lvl="0" marL="0" rtl="0" algn="l">
+              <a:pPr marL="0" lvl="0" indent="0" algn="l" rtl="0">
                 <a:spcBef>
                   <a:spcPts val="0"/>
                 </a:spcBef>
@@ -6421,9 +6552,6 @@
                 </a:spcAft>
                 <a:buNone/>
               </a:pPr>
-              <a:r>
-                <a:t/>
-              </a:r>
               <a:endParaRPr/>
             </a:p>
           </p:txBody>
@@ -6432,9 +6560,11 @@
       <p:sp>
         <p:nvSpPr>
           <p:cNvPr id="67" name="Google Shape;67;p13"/>
-          <p:cNvSpPr txBox="1"/>
+          <p:cNvSpPr txBox="1">
+            <a:spLocks noGrp="1"/>
+          </p:cNvSpPr>
           <p:nvPr>
-            <p:ph idx="4294967295" type="body"/>
+            <p:ph type="body" idx="4294967295"/>
           </p:nvPr>
         </p:nvSpPr>
         <p:spPr>
@@ -6447,12 +6577,12 @@
           </a:prstGeom>
         </p:spPr>
         <p:txBody>
-          <a:bodyPr anchorCtr="0" anchor="t" bIns="91425" lIns="91425" spcFirstLastPara="1" rIns="91425" wrap="square" tIns="91425">
+          <a:bodyPr spcFirstLastPara="1" wrap="square" lIns="91425" tIns="91425" rIns="91425" bIns="91425" anchor="t" anchorCtr="0">
             <a:noAutofit/>
           </a:bodyPr>
           <a:lstStyle/>
           <a:p>
-            <a:pPr indent="0" lvl="0" marL="0" rtl="0" algn="l">
+            <a:pPr marL="0" lvl="0" indent="0" algn="l" rtl="0">
               <a:spcBef>
                 <a:spcPts val="0"/>
               </a:spcBef>
@@ -6480,9 +6610,11 @@
       <p:sp>
         <p:nvSpPr>
           <p:cNvPr id="68" name="Google Shape;68;p13"/>
-          <p:cNvSpPr txBox="1"/>
+          <p:cNvSpPr txBox="1">
+            <a:spLocks noGrp="1"/>
+          </p:cNvSpPr>
           <p:nvPr>
-            <p:ph idx="4294967295" type="body"/>
+            <p:ph type="body" idx="4294967295"/>
           </p:nvPr>
         </p:nvSpPr>
         <p:spPr>
@@ -6495,30 +6627,71 @@
           </a:prstGeom>
         </p:spPr>
         <p:txBody>
-          <a:bodyPr anchorCtr="0" anchor="t" bIns="91425" lIns="91425" spcFirstLastPara="1" rIns="91425" wrap="square" tIns="91425">
+          <a:bodyPr spcFirstLastPara="1" wrap="square" lIns="91425" tIns="91425" rIns="91425" bIns="91425" anchor="t" anchorCtr="0">
             <a:noAutofit/>
           </a:bodyPr>
           <a:lstStyle/>
           <a:p>
-            <a:pPr indent="0" lvl="0" marL="0" rtl="0" algn="l">
-              <a:spcBef>
-                <a:spcPts val="0"/>
-              </a:spcBef>
-              <a:spcAft>
-                <a:spcPts val="0"/>
-              </a:spcAft>
-              <a:buNone/>
+            <a:pPr indent="-304800">
+              <a:lnSpc>
+                <a:spcPct val="100000"/>
+              </a:lnSpc>
+              <a:buSzPts val="1200"/>
             </a:pPr>
             <a:r>
-              <a:rPr b="1" lang="en" sz="1300"/>
-              <a:t>National Parks </a:t>
+              <a:rPr lang="en" sz="1200" b="1" dirty="0"/>
+              <a:t>National Parks Data</a:t>
             </a:r>
-            <a:endParaRPr b="1" sz="1300"/>
           </a:p>
           <a:p>
-            <a:pPr indent="-304800" lvl="0" marL="457200" rtl="0" algn="l">
-              <a:spcBef>
-                <a:spcPts val="800"/>
+            <a:pPr lvl="1" indent="-304800">
+              <a:lnSpc>
+                <a:spcPct val="100000"/>
+              </a:lnSpc>
+              <a:spcBef>
+                <a:spcPts val="0"/>
+              </a:spcBef>
+              <a:buSzPts val="1200"/>
+            </a:pPr>
+            <a:r>
+              <a:rPr lang="en" sz="800" dirty="0"/>
+              <a:t>Locations</a:t>
+            </a:r>
+          </a:p>
+          <a:p>
+            <a:pPr lvl="1" indent="-304800">
+              <a:lnSpc>
+                <a:spcPct val="100000"/>
+              </a:lnSpc>
+              <a:spcBef>
+                <a:spcPts val="0"/>
+              </a:spcBef>
+              <a:buSzPts val="1200"/>
+            </a:pPr>
+            <a:r>
+              <a:rPr lang="en" sz="800" dirty="0"/>
+              <a:t>Acreage</a:t>
+            </a:r>
+          </a:p>
+          <a:p>
+            <a:pPr lvl="1" indent="-304800">
+              <a:lnSpc>
+                <a:spcPct val="100000"/>
+              </a:lnSpc>
+              <a:spcBef>
+                <a:spcPts val="0"/>
+              </a:spcBef>
+              <a:buSzPts val="1200"/>
+            </a:pPr>
+            <a:r>
+              <a:rPr lang="en" sz="800" dirty="0"/>
+              <a:t>Visitation</a:t>
+            </a:r>
+          </a:p>
+          <a:p>
+            <a:pPr marL="457200" lvl="0" indent="-304800" algn="l" rtl="0">
+              <a:spcBef>
+                <a:spcPts val="0"/>
               </a:spcBef>
               <a:spcAft>
                 <a:spcPts val="0"/>
@@ -6527,13 +6700,43 @@
               <a:buChar char="●"/>
             </a:pPr>
             <a:r>
-              <a:rPr lang="en" sz="1200"/>
-              <a:t>1990-2019</a:t>
+              <a:rPr lang="en" sz="1200" b="1" dirty="0"/>
+              <a:t>NOAA Climate Data</a:t>
             </a:r>
-            <a:endParaRPr sz="1200"/>
           </a:p>
           <a:p>
-            <a:pPr indent="-304800" lvl="0" marL="457200" rtl="0" algn="l">
+            <a:pPr lvl="1" indent="-304800">
+              <a:lnSpc>
+                <a:spcPct val="100000"/>
+              </a:lnSpc>
+              <a:spcBef>
+                <a:spcPts val="0"/>
+              </a:spcBef>
+              <a:buSzPts val="1200"/>
+            </a:pPr>
+            <a:r>
+              <a:rPr lang="en" sz="800" dirty="0"/>
+              <a:t>Station/Latitude/Longitude</a:t>
+            </a:r>
+          </a:p>
+          <a:p>
+            <a:pPr lvl="1" indent="-304800">
+              <a:lnSpc>
+                <a:spcPct val="100000"/>
+              </a:lnSpc>
+              <a:spcBef>
+                <a:spcPts val="0"/>
+              </a:spcBef>
+              <a:buSzPts val="1200"/>
+            </a:pPr>
+            <a:r>
+              <a:rPr lang="en" sz="800" dirty="0"/>
+              <a:t>Precipitation</a:t>
+            </a:r>
+            <a:endParaRPr lang="en" sz="800" b="1" dirty="0"/>
+          </a:p>
+          <a:p>
+            <a:pPr marL="457200" lvl="0" indent="-304800" algn="l" rtl="0">
               <a:spcBef>
                 <a:spcPts val="0"/>
               </a:spcBef>
@@ -6544,95 +6747,74 @@
               <a:buChar char="●"/>
             </a:pPr>
             <a:r>
-              <a:rPr lang="en" sz="1200"/>
-              <a:t>Locations, Visitors, Acreage, Funding, Fees</a:t>
+              <a:rPr lang="en" sz="1200" b="1" dirty="0"/>
+              <a:t>Poverty Data</a:t>
             </a:r>
-            <a:endParaRPr sz="1200"/>
           </a:p>
           <a:p>
-            <a:pPr indent="-304800" lvl="0" marL="457200" rtl="0" algn="l">
-              <a:spcBef>
-                <a:spcPts val="0"/>
-              </a:spcBef>
-              <a:spcAft>
-                <a:spcPts val="0"/>
-              </a:spcAft>
+            <a:pPr lvl="1" indent="-304800">
+              <a:lnSpc>
+                <a:spcPct val="100000"/>
+              </a:lnSpc>
+              <a:spcBef>
+                <a:spcPts val="0"/>
+              </a:spcBef>
               <a:buSzPts val="1200"/>
-              <a:buChar char="●"/>
             </a:pPr>
             <a:r>
-              <a:rPr lang="en" sz="1200"/>
-              <a:t>Covariates gathered from other sources:</a:t>
+              <a:rPr lang="en" sz="800" dirty="0"/>
+              <a:t>Percent of State Living in Poverty (by Age)</a:t>
             </a:r>
-            <a:endParaRPr sz="1200"/>
           </a:p>
           <a:p>
-            <a:pPr indent="-304800" lvl="1" marL="914400" rtl="0" algn="l">
-              <a:spcBef>
-                <a:spcPts val="0"/>
-              </a:spcBef>
-              <a:spcAft>
-                <a:spcPts val="0"/>
-              </a:spcAft>
+            <a:pPr lvl="1" indent="-304800">
+              <a:lnSpc>
+                <a:spcPct val="100000"/>
+              </a:lnSpc>
+              <a:spcBef>
+                <a:spcPts val="0"/>
+              </a:spcBef>
               <a:buSzPts val="1200"/>
-              <a:buChar char="○"/>
             </a:pPr>
             <a:r>
-              <a:rPr lang="en" sz="1200"/>
-              <a:t>Climate Data</a:t>
+              <a:rPr lang="en" sz="800" dirty="0"/>
+              <a:t>Median Household income</a:t>
             </a:r>
-            <a:endParaRPr sz="1200"/>
           </a:p>
           <a:p>
-            <a:pPr indent="-304800" lvl="1" marL="914400" rtl="0" algn="l">
-              <a:spcBef>
-                <a:spcPts val="0"/>
-              </a:spcBef>
-              <a:spcAft>
-                <a:spcPts val="0"/>
-              </a:spcAft>
+            <a:pPr indent="-304800">
+              <a:lnSpc>
+                <a:spcPct val="100000"/>
+              </a:lnSpc>
               <a:buSzPts val="1200"/>
-              <a:buChar char="○"/>
+            </a:pPr>
+            <a:endParaRPr lang="en" sz="1200" b="1" dirty="0"/>
+          </a:p>
+          <a:p>
+            <a:pPr indent="-304800">
+              <a:lnSpc>
+                <a:spcPct val="100000"/>
+              </a:lnSpc>
+              <a:buSzPts val="1200"/>
+              <a:buFont typeface="Wingdings" panose="05000000000000000000" pitchFamily="2" charset="2"/>
+              <a:buChar char="Ø"/>
             </a:pPr>
             <a:r>
-              <a:rPr lang="en" sz="1200"/>
-              <a:t>Poverty Indicators</a:t>
+              <a:rPr lang="en" sz="1200" b="1" dirty="0"/>
+              <a:t>Results in one line per park, per month from 1995-2018</a:t>
             </a:r>
-            <a:endParaRPr sz="1200"/>
           </a:p>
           <a:p>
-            <a:pPr indent="-304800" lvl="1" marL="914400" rtl="0" algn="l">
-              <a:spcBef>
-                <a:spcPts val="0"/>
-              </a:spcBef>
-              <a:spcAft>
-                <a:spcPts val="0"/>
-              </a:spcAft>
+            <a:pPr lvl="1" indent="-304800">
+              <a:lnSpc>
+                <a:spcPct val="100000"/>
+              </a:lnSpc>
+              <a:spcBef>
+                <a:spcPts val="0"/>
+              </a:spcBef>
               <a:buSzPts val="1200"/>
-              <a:buChar char="○"/>
             </a:pPr>
-            <a:r>
-              <a:rPr lang="en" sz="1200"/>
-              <a:t>Business Attitudes</a:t>
-            </a:r>
-            <a:endParaRPr sz="1200"/>
-          </a:p>
-          <a:p>
-            <a:pPr indent="-304800" lvl="1" marL="914400" rtl="0" algn="l">
-              <a:spcBef>
-                <a:spcPts val="0"/>
-              </a:spcBef>
-              <a:spcAft>
-                <a:spcPts val="0"/>
-              </a:spcAft>
-              <a:buSzPts val="1200"/>
-              <a:buChar char="○"/>
-            </a:pPr>
-            <a:r>
-              <a:rPr lang="en" sz="1200"/>
-              <a:t>Changes in visitation by month</a:t>
-            </a:r>
-            <a:endParaRPr sz="1200"/>
+            <a:endParaRPr lang="en" sz="800" dirty="0"/>
           </a:p>
         </p:txBody>
       </p:sp>
@@ -6665,23 +6847,23 @@
               <a:avLst/>
             </a:prstGeom>
             <a:noFill/>
-            <a:ln cap="flat" cmpd="sng" w="9525">
+            <a:ln w="9525" cap="flat" cmpd="sng">
               <a:solidFill>
                 <a:schemeClr val="lt2"/>
               </a:solidFill>
               <a:prstDash val="solid"/>
               <a:round/>
-              <a:headEnd len="sm" w="sm" type="none"/>
-              <a:tailEnd len="sm" w="sm" type="none"/>
+              <a:headEnd type="none" w="sm" len="sm"/>
+              <a:tailEnd type="none" w="sm" len="sm"/>
             </a:ln>
           </p:spPr>
           <p:txBody>
-            <a:bodyPr anchorCtr="0" anchor="ctr" bIns="91425" lIns="91425" spcFirstLastPara="1" rIns="91425" wrap="square" tIns="91425">
+            <a:bodyPr spcFirstLastPara="1" wrap="square" lIns="91425" tIns="91425" rIns="91425" bIns="91425" anchor="ctr" anchorCtr="0">
               <a:noAutofit/>
             </a:bodyPr>
             <a:lstStyle/>
             <a:p>
-              <a:pPr indent="0" lvl="0" marL="0" rtl="0" algn="l">
+              <a:pPr marL="0" lvl="0" indent="0" algn="l" rtl="0">
                 <a:spcBef>
                   <a:spcPts val="0"/>
                 </a:spcBef>
@@ -6690,9 +6872,6 @@
                 </a:spcAft>
                 <a:buNone/>
               </a:pPr>
-              <a:r>
-                <a:t/>
-              </a:r>
               <a:endParaRPr/>
             </a:p>
           </p:txBody>
@@ -6719,12 +6898,12 @@
             </a:ln>
           </p:spPr>
           <p:txBody>
-            <a:bodyPr anchorCtr="0" anchor="ctr" bIns="91425" lIns="91425" spcFirstLastPara="1" rIns="91425" wrap="square" tIns="91425">
+            <a:bodyPr spcFirstLastPara="1" wrap="square" lIns="91425" tIns="91425" rIns="91425" bIns="91425" anchor="ctr" anchorCtr="0">
               <a:noAutofit/>
             </a:bodyPr>
             <a:lstStyle/>
             <a:p>
-              <a:pPr indent="0" lvl="0" marL="0" rtl="0" algn="l">
+              <a:pPr marL="0" lvl="0" indent="0" algn="l" rtl="0">
                 <a:spcBef>
                   <a:spcPts val="0"/>
                 </a:spcBef>
@@ -6733,9 +6912,6 @@
                 </a:spcAft>
                 <a:buNone/>
               </a:pPr>
-              <a:r>
-                <a:t/>
-              </a:r>
               <a:endParaRPr/>
             </a:p>
           </p:txBody>
@@ -6744,9 +6920,11 @@
       <p:sp>
         <p:nvSpPr>
           <p:cNvPr id="72" name="Google Shape;72;p13"/>
-          <p:cNvSpPr txBox="1"/>
+          <p:cNvSpPr txBox="1">
+            <a:spLocks noGrp="1"/>
+          </p:cNvSpPr>
           <p:nvPr>
-            <p:ph idx="4294967295" type="body"/>
+            <p:ph type="body" idx="4294967295"/>
           </p:nvPr>
         </p:nvSpPr>
         <p:spPr>
@@ -6759,12 +6937,12 @@
           </a:prstGeom>
         </p:spPr>
         <p:txBody>
-          <a:bodyPr anchorCtr="0" anchor="t" bIns="91425" lIns="91425" spcFirstLastPara="1" rIns="91425" wrap="square" tIns="91425">
+          <a:bodyPr spcFirstLastPara="1" wrap="square" lIns="91425" tIns="91425" rIns="91425" bIns="91425" anchor="t" anchorCtr="0">
             <a:noAutofit/>
           </a:bodyPr>
           <a:lstStyle/>
           <a:p>
-            <a:pPr indent="0" lvl="0" marL="0" rtl="0" algn="l">
+            <a:pPr marL="0" lvl="0" indent="0" algn="l" rtl="0">
               <a:spcBef>
                 <a:spcPts val="0"/>
               </a:spcBef>
@@ -6792,9 +6970,11 @@
       <p:sp>
         <p:nvSpPr>
           <p:cNvPr id="73" name="Google Shape;73;p13"/>
-          <p:cNvSpPr txBox="1"/>
+          <p:cNvSpPr txBox="1">
+            <a:spLocks noGrp="1"/>
+          </p:cNvSpPr>
           <p:nvPr>
-            <p:ph idx="4294967295" type="body"/>
+            <p:ph type="body" idx="4294967295"/>
           </p:nvPr>
         </p:nvSpPr>
         <p:spPr>
@@ -6807,12 +6987,12 @@
           </a:prstGeom>
         </p:spPr>
         <p:txBody>
-          <a:bodyPr anchorCtr="0" anchor="t" bIns="91425" lIns="91425" spcFirstLastPara="1" rIns="91425" wrap="square" tIns="91425">
+          <a:bodyPr spcFirstLastPara="1" wrap="square" lIns="91425" tIns="91425" rIns="91425" bIns="91425" anchor="t" anchorCtr="0">
             <a:noAutofit/>
           </a:bodyPr>
           <a:lstStyle/>
           <a:p>
-            <a:pPr indent="-292100" lvl="0" marL="457200" rtl="0" algn="l">
+            <a:pPr marL="457200" lvl="0" indent="-292100" algn="l" rtl="0">
               <a:spcBef>
                 <a:spcPts val="0"/>
               </a:spcBef>
@@ -6823,13 +7003,13 @@
               <a:buChar char="●"/>
             </a:pPr>
             <a:r>
-              <a:rPr b="1" lang="en" sz="1000"/>
+              <a:rPr lang="en" sz="1000" b="1"/>
               <a:t>When</a:t>
             </a:r>
-            <a:endParaRPr b="1" sz="1000"/>
+            <a:endParaRPr sz="1000" b="1"/>
           </a:p>
           <a:p>
-            <a:pPr indent="-292100" lvl="1" marL="914400" rtl="0" algn="l">
+            <a:pPr marL="914400" lvl="1" indent="-292100" algn="l" rtl="0">
               <a:spcBef>
                 <a:spcPts val="0"/>
               </a:spcBef>
@@ -6846,7 +7026,7 @@
             <a:endParaRPr sz="1000"/>
           </a:p>
           <a:p>
-            <a:pPr indent="-292100" lvl="0" marL="457200" rtl="0" algn="l">
+            <a:pPr marL="457200" lvl="0" indent="-292100" algn="l" rtl="0">
               <a:spcBef>
                 <a:spcPts val="0"/>
               </a:spcBef>
@@ -6857,13 +7037,13 @@
               <a:buChar char="●"/>
             </a:pPr>
             <a:r>
-              <a:rPr b="1" lang="en" sz="1000"/>
+              <a:rPr lang="en" sz="1000" b="1"/>
               <a:t>Who</a:t>
             </a:r>
-            <a:endParaRPr b="1" sz="1000"/>
+            <a:endParaRPr sz="1000" b="1"/>
           </a:p>
           <a:p>
-            <a:pPr indent="-292100" lvl="1" marL="914400" rtl="0" algn="l">
+            <a:pPr marL="914400" lvl="1" indent="-292100" algn="l" rtl="0">
               <a:spcBef>
                 <a:spcPts val="0"/>
               </a:spcBef>
@@ -6880,7 +7060,7 @@
             <a:endParaRPr sz="1000"/>
           </a:p>
           <a:p>
-            <a:pPr indent="-292100" lvl="1" marL="914400" rtl="0" algn="l">
+            <a:pPr marL="914400" lvl="1" indent="-292100" algn="l" rtl="0">
               <a:spcBef>
                 <a:spcPts val="0"/>
               </a:spcBef>
@@ -6897,7 +7077,7 @@
             <a:endParaRPr sz="1000"/>
           </a:p>
           <a:p>
-            <a:pPr indent="-292100" lvl="0" marL="457200" rtl="0" algn="l">
+            <a:pPr marL="457200" lvl="0" indent="-292100" algn="l" rtl="0">
               <a:spcBef>
                 <a:spcPts val="0"/>
               </a:spcBef>
@@ -6908,13 +7088,13 @@
               <a:buChar char="●"/>
             </a:pPr>
             <a:r>
-              <a:rPr b="1" lang="en" sz="1000"/>
+              <a:rPr lang="en" sz="1000" b="1"/>
               <a:t>How</a:t>
             </a:r>
-            <a:endParaRPr b="1" sz="1000"/>
+            <a:endParaRPr sz="1000" b="1"/>
           </a:p>
           <a:p>
-            <a:pPr indent="-292100" lvl="1" marL="914400" rtl="0" algn="l">
+            <a:pPr marL="914400" lvl="1" indent="-292100" algn="l" rtl="0">
               <a:spcBef>
                 <a:spcPts val="0"/>
               </a:spcBef>
@@ -6961,23 +7141,23 @@
               <a:avLst/>
             </a:prstGeom>
             <a:noFill/>
-            <a:ln cap="flat" cmpd="sng" w="9525">
+            <a:ln w="9525" cap="flat" cmpd="sng">
               <a:solidFill>
                 <a:schemeClr val="lt2"/>
               </a:solidFill>
               <a:prstDash val="solid"/>
               <a:round/>
-              <a:headEnd len="sm" w="sm" type="none"/>
-              <a:tailEnd len="sm" w="sm" type="none"/>
+              <a:headEnd type="none" w="sm" len="sm"/>
+              <a:tailEnd type="none" w="sm" len="sm"/>
             </a:ln>
           </p:spPr>
           <p:txBody>
-            <a:bodyPr anchorCtr="0" anchor="ctr" bIns="91425" lIns="91425" spcFirstLastPara="1" rIns="91425" wrap="square" tIns="91425">
+            <a:bodyPr spcFirstLastPara="1" wrap="square" lIns="91425" tIns="91425" rIns="91425" bIns="91425" anchor="ctr" anchorCtr="0">
               <a:noAutofit/>
             </a:bodyPr>
             <a:lstStyle/>
             <a:p>
-              <a:pPr indent="0" lvl="0" marL="0" rtl="0" algn="l">
+              <a:pPr marL="0" lvl="0" indent="0" algn="l" rtl="0">
                 <a:spcBef>
                   <a:spcPts val="0"/>
                 </a:spcBef>
@@ -6986,9 +7166,6 @@
                 </a:spcAft>
                 <a:buNone/>
               </a:pPr>
-              <a:r>
-                <a:t/>
-              </a:r>
               <a:endParaRPr/>
             </a:p>
           </p:txBody>
@@ -7015,12 +7192,12 @@
             </a:ln>
           </p:spPr>
           <p:txBody>
-            <a:bodyPr anchorCtr="0" anchor="ctr" bIns="91425" lIns="91425" spcFirstLastPara="1" rIns="91425" wrap="square" tIns="91425">
+            <a:bodyPr spcFirstLastPara="1" wrap="square" lIns="91425" tIns="91425" rIns="91425" bIns="91425" anchor="ctr" anchorCtr="0">
               <a:noAutofit/>
             </a:bodyPr>
             <a:lstStyle/>
             <a:p>
-              <a:pPr indent="0" lvl="0" marL="0" rtl="0" algn="l">
+              <a:pPr marL="0" lvl="0" indent="0" algn="l" rtl="0">
                 <a:spcBef>
                   <a:spcPts val="0"/>
                 </a:spcBef>
@@ -7029,9 +7206,6 @@
                 </a:spcAft>
                 <a:buNone/>
               </a:pPr>
-              <a:r>
-                <a:t/>
-              </a:r>
               <a:endParaRPr/>
             </a:p>
           </p:txBody>
@@ -7040,9 +7214,11 @@
       <p:sp>
         <p:nvSpPr>
           <p:cNvPr id="77" name="Google Shape;77;p13"/>
-          <p:cNvSpPr txBox="1"/>
+          <p:cNvSpPr txBox="1">
+            <a:spLocks noGrp="1"/>
+          </p:cNvSpPr>
           <p:nvPr>
-            <p:ph idx="4294967295" type="body"/>
+            <p:ph type="body" idx="4294967295"/>
           </p:nvPr>
         </p:nvSpPr>
         <p:spPr>
@@ -7055,12 +7231,12 @@
           </a:prstGeom>
         </p:spPr>
         <p:txBody>
-          <a:bodyPr anchorCtr="0" anchor="t" bIns="91425" lIns="91425" spcFirstLastPara="1" rIns="91425" wrap="square" tIns="91425">
+          <a:bodyPr spcFirstLastPara="1" wrap="square" lIns="91425" tIns="91425" rIns="91425" bIns="91425" anchor="t" anchorCtr="0">
             <a:noAutofit/>
           </a:bodyPr>
           <a:lstStyle/>
           <a:p>
-            <a:pPr indent="0" lvl="0" marL="0" rtl="0" algn="l">
+            <a:pPr marL="0" lvl="0" indent="0" algn="l" rtl="0">
               <a:spcBef>
                 <a:spcPts val="0"/>
               </a:spcBef>
@@ -7088,9 +7264,11 @@
       <p:sp>
         <p:nvSpPr>
           <p:cNvPr id="78" name="Google Shape;78;p13"/>
-          <p:cNvSpPr txBox="1"/>
+          <p:cNvSpPr txBox="1">
+            <a:spLocks noGrp="1"/>
+          </p:cNvSpPr>
           <p:nvPr>
-            <p:ph idx="4294967295" type="body"/>
+            <p:ph type="body" idx="4294967295"/>
           </p:nvPr>
         </p:nvSpPr>
         <p:spPr>
@@ -7103,12 +7281,12 @@
           </a:prstGeom>
         </p:spPr>
         <p:txBody>
-          <a:bodyPr anchorCtr="0" anchor="t" bIns="91425" lIns="91425" spcFirstLastPara="1" rIns="91425" wrap="square" tIns="91425">
+          <a:bodyPr spcFirstLastPara="1" wrap="square" lIns="91425" tIns="91425" rIns="91425" bIns="91425" anchor="t" anchorCtr="0">
             <a:noAutofit/>
           </a:bodyPr>
           <a:lstStyle/>
           <a:p>
-            <a:pPr indent="0" lvl="0" marL="0" rtl="0" algn="l">
+            <a:pPr marL="0" lvl="0" indent="0" algn="l" rtl="0">
               <a:spcBef>
                 <a:spcPts val="0"/>
               </a:spcBef>
@@ -7118,13 +7296,13 @@
               <a:buNone/>
             </a:pPr>
             <a:r>
-              <a:rPr b="1" lang="en" sz="1100"/>
+              <a:rPr lang="en" sz="1100" b="1"/>
               <a:t>Clustering</a:t>
             </a:r>
-            <a:endParaRPr b="1" sz="1100"/>
+            <a:endParaRPr sz="1100" b="1"/>
           </a:p>
           <a:p>
-            <a:pPr indent="-285750" lvl="0" marL="457200" rtl="0" algn="l">
+            <a:pPr marL="457200" lvl="0" indent="-285750" algn="l" rtl="0">
               <a:spcBef>
                 <a:spcPts val="800"/>
               </a:spcBef>
@@ -7141,7 +7319,7 @@
             <a:endParaRPr sz="900"/>
           </a:p>
           <a:p>
-            <a:pPr indent="-285750" lvl="0" marL="457200" rtl="0" algn="l">
+            <a:pPr marL="457200" lvl="0" indent="-285750" algn="l" rtl="0">
               <a:spcBef>
                 <a:spcPts val="0"/>
               </a:spcBef>
@@ -7158,7 +7336,7 @@
             <a:endParaRPr sz="900"/>
           </a:p>
           <a:p>
-            <a:pPr indent="0" lvl="0" marL="0" rtl="0" algn="l">
+            <a:pPr marL="0" lvl="0" indent="0" algn="l" rtl="0">
               <a:spcBef>
                 <a:spcPts val="800"/>
               </a:spcBef>
@@ -7168,13 +7346,13 @@
               <a:buNone/>
             </a:pPr>
             <a:r>
-              <a:rPr b="1" lang="en" sz="1100"/>
+              <a:rPr lang="en" sz="1100" b="1"/>
               <a:t>Time Series</a:t>
             </a:r>
-            <a:endParaRPr b="1" sz="1100"/>
+            <a:endParaRPr sz="1100" b="1"/>
           </a:p>
           <a:p>
-            <a:pPr indent="-285750" lvl="0" marL="457200" rtl="0" algn="l">
+            <a:pPr marL="457200" lvl="0" indent="-285750" algn="l" rtl="0">
               <a:spcBef>
                 <a:spcPts val="800"/>
               </a:spcBef>
@@ -7191,7 +7369,7 @@
             <a:endParaRPr sz="900"/>
           </a:p>
           <a:p>
-            <a:pPr indent="0" lvl="0" marL="0" rtl="0" algn="l">
+            <a:pPr marL="0" lvl="0" indent="0" algn="l" rtl="0">
               <a:spcBef>
                 <a:spcPts val="800"/>
               </a:spcBef>
@@ -7201,13 +7379,13 @@
               <a:buNone/>
             </a:pPr>
             <a:r>
-              <a:rPr b="1" lang="en" sz="1100"/>
+              <a:rPr lang="en" sz="1100" b="1"/>
               <a:t>Boosting and Neural Nets</a:t>
             </a:r>
-            <a:endParaRPr b="1" sz="1100"/>
+            <a:endParaRPr sz="1100" b="1"/>
           </a:p>
           <a:p>
-            <a:pPr indent="-285750" lvl="0" marL="457200" rtl="0" algn="l">
+            <a:pPr marL="457200" lvl="0" indent="-285750" algn="l" rtl="0">
               <a:spcBef>
                 <a:spcPts val="800"/>
               </a:spcBef>
@@ -7245,12 +7423,12 @@
           </a:ln>
         </p:spPr>
         <p:txBody>
-          <a:bodyPr anchorCtr="0" anchor="t" bIns="91425" lIns="91425" spcFirstLastPara="1" rIns="91425" wrap="square" tIns="91425">
+          <a:bodyPr spcFirstLastPara="1" wrap="square" lIns="91425" tIns="91425" rIns="91425" bIns="91425" anchor="t" anchorCtr="0">
             <a:noAutofit/>
           </a:bodyPr>
           <a:lstStyle/>
           <a:p>
-            <a:pPr indent="0" lvl="0" marL="0" rtl="0" algn="ctr">
+            <a:pPr marL="0" lvl="0" indent="0" algn="ctr" rtl="0">
               <a:spcBef>
                 <a:spcPts val="0"/>
               </a:spcBef>
@@ -7294,7 +7472,7 @@
 </file>
 
 <file path=ppt/theme/theme1.xml><?xml version="1.0" encoding="utf-8"?>
-<a:theme xmlns:a="http://schemas.openxmlformats.org/drawingml/2006/main" xmlns:r="http://schemas.openxmlformats.org/officeDocument/2006/relationships" name="Luxe">
+<a:theme xmlns:a="http://schemas.openxmlformats.org/drawingml/2006/main" name="Luxe">
   <a:themeElements>
     <a:clrScheme name="Luxe">
       <a:dk1>
@@ -7569,11 +7747,13 @@
       </a:bgFillStyleLst>
     </a:fmtScheme>
   </a:themeElements>
+  <a:objectDefaults/>
+  <a:extraClrSchemeLst/>
 </a:theme>
 </file>
 
 <file path=ppt/theme/theme2.xml><?xml version="1.0" encoding="utf-8"?>
-<a:theme xmlns:a="http://schemas.openxmlformats.org/drawingml/2006/main" xmlns:r="http://schemas.openxmlformats.org/officeDocument/2006/relationships">
+<a:theme xmlns:a="http://schemas.openxmlformats.org/drawingml/2006/main">
   <a:themeElements>
     <a:clrScheme name="Default">
       <a:dk1>
@@ -7848,5 +8028,7 @@
       </a:bgFillStyleLst>
     </a:fmtScheme>
   </a:themeElements>
+  <a:objectDefaults/>
+  <a:extraClrSchemeLst/>
 </a:theme>
 </file>
</xml_diff>